<commit_message>
Added files generated during meeting
</commit_message>
<xml_diff>
--- a/Presentation/Presentation.pptx
+++ b/Presentation/Presentation.pptx
@@ -7,20 +7,17 @@
   <p:sldIdLst>
     <p:sldId id="256" r:id="rId2"/>
     <p:sldId id="257" r:id="rId3"/>
-    <p:sldId id="258" r:id="rId4"/>
-    <p:sldId id="272" r:id="rId5"/>
+    <p:sldId id="272" r:id="rId4"/>
+    <p:sldId id="258" r:id="rId5"/>
     <p:sldId id="259" r:id="rId6"/>
-    <p:sldId id="260" r:id="rId7"/>
-    <p:sldId id="261" r:id="rId8"/>
-    <p:sldId id="262" r:id="rId9"/>
-    <p:sldId id="263" r:id="rId10"/>
-    <p:sldId id="264" r:id="rId11"/>
-    <p:sldId id="265" r:id="rId12"/>
-    <p:sldId id="266" r:id="rId13"/>
-    <p:sldId id="268" r:id="rId14"/>
-    <p:sldId id="269" r:id="rId15"/>
-    <p:sldId id="270" r:id="rId16"/>
-    <p:sldId id="271" r:id="rId17"/>
+    <p:sldId id="273" r:id="rId7"/>
+    <p:sldId id="260" r:id="rId8"/>
+    <p:sldId id="261" r:id="rId9"/>
+    <p:sldId id="264" r:id="rId10"/>
+    <p:sldId id="265" r:id="rId11"/>
+    <p:sldId id="266" r:id="rId12"/>
+    <p:sldId id="268" r:id="rId13"/>
+    <p:sldId id="271" r:id="rId14"/>
   </p:sldIdLst>
   <p:sldSz cx="9144000" cy="6858000" type="screen4x3"/>
   <p:notesSz cx="6858000" cy="9144000"/>
@@ -3743,6 +3740,13 @@
   <p:clrMapOvr>
     <a:masterClrMapping/>
   </p:clrMapOvr>
+  <p:timing>
+    <p:tnLst>
+      <p:par>
+        <p:cTn xmlns:p14="http://schemas.microsoft.com/office/powerpoint/2010/main" id="1" dur="indefinite" restart="never" nodeType="tmRoot"/>
+      </p:par>
+    </p:tnLst>
+  </p:timing>
 </p:sld>
 </file>
 
@@ -3780,7 +3784,7 @@
           <a:p>
             <a:r>
               <a:rPr lang="en-US" dirty="0" smtClean="0"/>
-              <a:t>Analysis 1</a:t>
+              <a:t>State Machine</a:t>
             </a:r>
             <a:endParaRPr lang="en-US" dirty="0"/>
           </a:p>
@@ -3801,10 +3805,9 @@
           <a:bodyPr/>
           <a:lstStyle/>
           <a:p>
-            <a:r>
-              <a:rPr lang="en-US" dirty="0" smtClean="0"/>
-              <a:t>Use Case Diagram</a:t>
-            </a:r>
+            <a:pPr marL="36576" indent="0">
+              <a:buNone/>
+            </a:pPr>
             <a:endParaRPr lang="en-US" dirty="0"/>
           </a:p>
         </p:txBody>
@@ -3812,13 +3815,20 @@
     </p:spTree>
     <p:extLst>
       <p:ext uri="{BB962C8B-B14F-4D97-AF65-F5344CB8AC3E}">
-        <p14:creationId xmlns:p14="http://schemas.microsoft.com/office/powerpoint/2010/main" val="2483841844"/>
+        <p14:creationId xmlns:p14="http://schemas.microsoft.com/office/powerpoint/2010/main" val="610290186"/>
       </p:ext>
     </p:extLst>
   </p:cSld>
   <p:clrMapOvr>
     <a:masterClrMapping/>
   </p:clrMapOvr>
+  <p:timing>
+    <p:tnLst>
+      <p:par>
+        <p:cTn xmlns:p14="http://schemas.microsoft.com/office/powerpoint/2010/main" id="1" dur="indefinite" restart="never" nodeType="tmRoot"/>
+      </p:par>
+    </p:tnLst>
+  </p:timing>
 </p:sld>
 </file>
 
@@ -3856,7 +3866,7 @@
           <a:p>
             <a:r>
               <a:rPr lang="en-US" dirty="0" smtClean="0"/>
-              <a:t>Analysis 2</a:t>
+              <a:t>Use Case Specifications</a:t>
             </a:r>
             <a:endParaRPr lang="en-US" dirty="0"/>
           </a:p>
@@ -3879,10 +3889,8 @@
           <a:p>
             <a:r>
               <a:rPr lang="en-US" dirty="0" smtClean="0"/>
-              <a:t>State Machine</a:t>
-            </a:r>
-          </a:p>
-          <a:p>
+              <a:t>Use Case Specifications</a:t>
+            </a:r>
             <a:endParaRPr lang="en-US" dirty="0"/>
           </a:p>
         </p:txBody>
@@ -3890,13 +3898,20 @@
     </p:spTree>
     <p:extLst>
       <p:ext uri="{BB962C8B-B14F-4D97-AF65-F5344CB8AC3E}">
-        <p14:creationId xmlns:p14="http://schemas.microsoft.com/office/powerpoint/2010/main" val="610290186"/>
+        <p14:creationId xmlns:p14="http://schemas.microsoft.com/office/powerpoint/2010/main" val="3726645878"/>
       </p:ext>
     </p:extLst>
   </p:cSld>
   <p:clrMapOvr>
     <a:masterClrMapping/>
   </p:clrMapOvr>
+  <p:timing>
+    <p:tnLst>
+      <p:par>
+        <p:cTn xmlns:p14="http://schemas.microsoft.com/office/powerpoint/2010/main" id="1" dur="indefinite" restart="never" nodeType="tmRoot"/>
+      </p:par>
+    </p:tnLst>
+  </p:timing>
 </p:sld>
 </file>
 
@@ -3934,7 +3949,7 @@
           <a:p>
             <a:r>
               <a:rPr lang="en-US" dirty="0" smtClean="0"/>
-              <a:t>Analysis 3</a:t>
+              <a:t>Design 1</a:t>
             </a:r>
             <a:endParaRPr lang="en-US" dirty="0"/>
           </a:p>
@@ -3955,9 +3970,30 @@
           <a:bodyPr/>
           <a:lstStyle/>
           <a:p>
+            <a:endParaRPr lang="en-US" dirty="0" smtClean="0"/>
+          </a:p>
+          <a:p>
             <a:r>
               <a:rPr lang="en-US" dirty="0" smtClean="0"/>
-              <a:t>Use Case Specifications</a:t>
+              <a:t>Consumption of fuel as a function of acceleration plus a constant</a:t>
+            </a:r>
+          </a:p>
+          <a:p>
+            <a:r>
+              <a:rPr lang="en-US" dirty="0" smtClean="0"/>
+              <a:t>Use files to log data sets</a:t>
+            </a:r>
+          </a:p>
+          <a:p>
+            <a:r>
+              <a:rPr lang="en-US" dirty="0" smtClean="0"/>
+              <a:t>Cap car speed</a:t>
+            </a:r>
+          </a:p>
+          <a:p>
+            <a:r>
+              <a:rPr lang="en-US" dirty="0" smtClean="0"/>
+              <a:t>Acceleration is capped and is based off the delta between current and desired speed</a:t>
             </a:r>
             <a:endParaRPr lang="en-US" dirty="0"/>
           </a:p>
@@ -3966,13 +4002,20 @@
     </p:spTree>
     <p:extLst>
       <p:ext uri="{BB962C8B-B14F-4D97-AF65-F5344CB8AC3E}">
-        <p14:creationId xmlns:p14="http://schemas.microsoft.com/office/powerpoint/2010/main" val="3726645878"/>
+        <p14:creationId xmlns:p14="http://schemas.microsoft.com/office/powerpoint/2010/main" val="3953020879"/>
       </p:ext>
     </p:extLst>
   </p:cSld>
   <p:clrMapOvr>
     <a:masterClrMapping/>
   </p:clrMapOvr>
+  <p:timing>
+    <p:tnLst>
+      <p:par>
+        <p:cTn xmlns:p14="http://schemas.microsoft.com/office/powerpoint/2010/main" id="1" dur="indefinite" restart="never" nodeType="tmRoot"/>
+      </p:par>
+    </p:tnLst>
+  </p:timing>
 </p:sld>
 </file>
 
@@ -4010,7 +4053,7 @@
           <a:p>
             <a:r>
               <a:rPr lang="en-US" dirty="0" smtClean="0"/>
-              <a:t>Design 1</a:t>
+              <a:t>Closing Remarks</a:t>
             </a:r>
             <a:endParaRPr lang="en-US" dirty="0"/>
           </a:p>
@@ -4031,223 +4074,23 @@
           <a:bodyPr/>
           <a:lstStyle/>
           <a:p>
-            <a:endParaRPr lang="en-US"/>
-          </a:p>
-        </p:txBody>
-      </p:sp>
-    </p:spTree>
-    <p:extLst>
-      <p:ext uri="{BB962C8B-B14F-4D97-AF65-F5344CB8AC3E}">
-        <p14:creationId xmlns:p14="http://schemas.microsoft.com/office/powerpoint/2010/main" val="3953020879"/>
-      </p:ext>
-    </p:extLst>
-  </p:cSld>
-  <p:clrMapOvr>
-    <a:masterClrMapping/>
-  </p:clrMapOvr>
-</p:sld>
-</file>
-
-<file path=ppt/slides/slide14.xml><?xml version="1.0" encoding="utf-8"?>
-<p:sld xmlns:a="http://schemas.openxmlformats.org/drawingml/2006/main" xmlns:r="http://schemas.openxmlformats.org/officeDocument/2006/relationships" xmlns:p="http://schemas.openxmlformats.org/presentationml/2006/main">
-  <p:cSld>
-    <p:spTree>
-      <p:nvGrpSpPr>
-        <p:cNvPr id="1" name=""/>
-        <p:cNvGrpSpPr/>
-        <p:nvPr/>
-      </p:nvGrpSpPr>
-      <p:grpSpPr>
-        <a:xfrm>
-          <a:off x="0" y="0"/>
-          <a:ext cx="0" cy="0"/>
-          <a:chOff x="0" y="0"/>
-          <a:chExt cx="0" cy="0"/>
-        </a:xfrm>
-      </p:grpSpPr>
-      <p:sp>
-        <p:nvSpPr>
-          <p:cNvPr id="2" name="Title 1"/>
-          <p:cNvSpPr>
-            <a:spLocks noGrp="1"/>
-          </p:cNvSpPr>
-          <p:nvPr>
-            <p:ph type="title"/>
-          </p:nvPr>
-        </p:nvSpPr>
-        <p:spPr/>
-        <p:txBody>
-          <a:bodyPr/>
-          <a:lstStyle/>
-          <a:p>
             <a:r>
               <a:rPr lang="en-US" dirty="0" smtClean="0"/>
-              <a:t>Design 2</a:t>
+              <a:t>Questions?</a:t>
+            </a:r>
+          </a:p>
+          <a:p>
+            <a:r>
+              <a:rPr lang="en-US" dirty="0" smtClean="0"/>
+              <a:t>Rotten tomatoes?</a:t>
+            </a:r>
+          </a:p>
+          <a:p>
+            <a:r>
+              <a:rPr lang="en-US" dirty="0" smtClean="0"/>
+              <a:t>Moral conundrums?</a:t>
             </a:r>
             <a:endParaRPr lang="en-US" dirty="0"/>
-          </a:p>
-        </p:txBody>
-      </p:sp>
-      <p:sp>
-        <p:nvSpPr>
-          <p:cNvPr id="3" name="Content Placeholder 2"/>
-          <p:cNvSpPr>
-            <a:spLocks noGrp="1"/>
-          </p:cNvSpPr>
-          <p:nvPr>
-            <p:ph idx="1"/>
-          </p:nvPr>
-        </p:nvSpPr>
-        <p:spPr/>
-        <p:txBody>
-          <a:bodyPr/>
-          <a:lstStyle/>
-          <a:p>
-            <a:endParaRPr lang="en-US"/>
-          </a:p>
-        </p:txBody>
-      </p:sp>
-    </p:spTree>
-    <p:extLst>
-      <p:ext uri="{BB962C8B-B14F-4D97-AF65-F5344CB8AC3E}">
-        <p14:creationId xmlns:p14="http://schemas.microsoft.com/office/powerpoint/2010/main" val="117445801"/>
-      </p:ext>
-    </p:extLst>
-  </p:cSld>
-  <p:clrMapOvr>
-    <a:masterClrMapping/>
-  </p:clrMapOvr>
-</p:sld>
-</file>
-
-<file path=ppt/slides/slide15.xml><?xml version="1.0" encoding="utf-8"?>
-<p:sld xmlns:a="http://schemas.openxmlformats.org/drawingml/2006/main" xmlns:r="http://schemas.openxmlformats.org/officeDocument/2006/relationships" xmlns:p="http://schemas.openxmlformats.org/presentationml/2006/main">
-  <p:cSld>
-    <p:spTree>
-      <p:nvGrpSpPr>
-        <p:cNvPr id="1" name=""/>
-        <p:cNvGrpSpPr/>
-        <p:nvPr/>
-      </p:nvGrpSpPr>
-      <p:grpSpPr>
-        <a:xfrm>
-          <a:off x="0" y="0"/>
-          <a:ext cx="0" cy="0"/>
-          <a:chOff x="0" y="0"/>
-          <a:chExt cx="0" cy="0"/>
-        </a:xfrm>
-      </p:grpSpPr>
-      <p:sp>
-        <p:nvSpPr>
-          <p:cNvPr id="2" name="Title 1"/>
-          <p:cNvSpPr>
-            <a:spLocks noGrp="1"/>
-          </p:cNvSpPr>
-          <p:nvPr>
-            <p:ph type="title"/>
-          </p:nvPr>
-        </p:nvSpPr>
-        <p:spPr/>
-        <p:txBody>
-          <a:bodyPr/>
-          <a:lstStyle/>
-          <a:p>
-            <a:r>
-              <a:rPr lang="en-US" dirty="0" smtClean="0"/>
-              <a:t>Future Plans</a:t>
-            </a:r>
-            <a:endParaRPr lang="en-US" dirty="0"/>
-          </a:p>
-        </p:txBody>
-      </p:sp>
-      <p:sp>
-        <p:nvSpPr>
-          <p:cNvPr id="3" name="Content Placeholder 2"/>
-          <p:cNvSpPr>
-            <a:spLocks noGrp="1"/>
-          </p:cNvSpPr>
-          <p:nvPr>
-            <p:ph idx="1"/>
-          </p:nvPr>
-        </p:nvSpPr>
-        <p:spPr/>
-        <p:txBody>
-          <a:bodyPr/>
-          <a:lstStyle/>
-          <a:p>
-            <a:endParaRPr lang="en-US"/>
-          </a:p>
-        </p:txBody>
-      </p:sp>
-    </p:spTree>
-    <p:extLst>
-      <p:ext uri="{BB962C8B-B14F-4D97-AF65-F5344CB8AC3E}">
-        <p14:creationId xmlns:p14="http://schemas.microsoft.com/office/powerpoint/2010/main" val="943079606"/>
-      </p:ext>
-    </p:extLst>
-  </p:cSld>
-  <p:clrMapOvr>
-    <a:masterClrMapping/>
-  </p:clrMapOvr>
-</p:sld>
-</file>
-
-<file path=ppt/slides/slide16.xml><?xml version="1.0" encoding="utf-8"?>
-<p:sld xmlns:a="http://schemas.openxmlformats.org/drawingml/2006/main" xmlns:r="http://schemas.openxmlformats.org/officeDocument/2006/relationships" xmlns:p="http://schemas.openxmlformats.org/presentationml/2006/main">
-  <p:cSld>
-    <p:spTree>
-      <p:nvGrpSpPr>
-        <p:cNvPr id="1" name=""/>
-        <p:cNvGrpSpPr/>
-        <p:nvPr/>
-      </p:nvGrpSpPr>
-      <p:grpSpPr>
-        <a:xfrm>
-          <a:off x="0" y="0"/>
-          <a:ext cx="0" cy="0"/>
-          <a:chOff x="0" y="0"/>
-          <a:chExt cx="0" cy="0"/>
-        </a:xfrm>
-      </p:grpSpPr>
-      <p:sp>
-        <p:nvSpPr>
-          <p:cNvPr id="2" name="Title 1"/>
-          <p:cNvSpPr>
-            <a:spLocks noGrp="1"/>
-          </p:cNvSpPr>
-          <p:nvPr>
-            <p:ph type="title"/>
-          </p:nvPr>
-        </p:nvSpPr>
-        <p:spPr/>
-        <p:txBody>
-          <a:bodyPr/>
-          <a:lstStyle/>
-          <a:p>
-            <a:r>
-              <a:rPr lang="en-US" dirty="0" smtClean="0"/>
-              <a:t>Closing Remarks</a:t>
-            </a:r>
-            <a:endParaRPr lang="en-US" dirty="0"/>
-          </a:p>
-        </p:txBody>
-      </p:sp>
-      <p:sp>
-        <p:nvSpPr>
-          <p:cNvPr id="3" name="Content Placeholder 2"/>
-          <p:cNvSpPr>
-            <a:spLocks noGrp="1"/>
-          </p:cNvSpPr>
-          <p:nvPr>
-            <p:ph idx="1"/>
-          </p:nvPr>
-        </p:nvSpPr>
-        <p:spPr/>
-        <p:txBody>
-          <a:bodyPr/>
-          <a:lstStyle/>
-          <a:p>
-            <a:endParaRPr lang="en-US"/>
           </a:p>
         </p:txBody>
       </p:sp>
@@ -4261,6 +4104,13 @@
   <p:clrMapOvr>
     <a:masterClrMapping/>
   </p:clrMapOvr>
+  <p:timing>
+    <p:tnLst>
+      <p:par>
+        <p:cTn xmlns:p14="http://schemas.microsoft.com/office/powerpoint/2010/main" id="1" dur="indefinite" restart="never" nodeType="tmRoot"/>
+      </p:par>
+    </p:tnLst>
+  </p:timing>
 </p:sld>
 </file>
 
@@ -4375,6 +4225,13 @@
   <p:clrMapOvr>
     <a:masterClrMapping/>
   </p:clrMapOvr>
+  <p:timing>
+    <p:tnLst>
+      <p:par>
+        <p:cTn xmlns:p14="http://schemas.microsoft.com/office/powerpoint/2010/main" id="1" dur="indefinite" restart="never" nodeType="tmRoot"/>
+      </p:par>
+    </p:tnLst>
+  </p:timing>
 </p:sld>
 </file>
 
@@ -4407,37 +4264,35 @@
         </p:nvSpPr>
         <p:spPr/>
         <p:txBody>
-          <a:bodyPr>
-            <a:normAutofit/>
-          </a:bodyPr>
-          <a:lstStyle/>
-          <a:p>
-            <a:r>
-              <a:rPr lang="en-US" dirty="0" smtClean="0"/>
-              <a:t>Planning 1</a:t>
-            </a:r>
-            <a:endParaRPr lang="en-US" dirty="0"/>
-          </a:p>
-        </p:txBody>
-      </p:sp>
-      <p:sp>
-        <p:nvSpPr>
-          <p:cNvPr id="3" name="Content Placeholder 2"/>
-          <p:cNvSpPr>
-            <a:spLocks noGrp="1"/>
-          </p:cNvSpPr>
-          <p:nvPr>
-            <p:ph idx="1"/>
-          </p:nvPr>
-        </p:nvSpPr>
-        <p:spPr/>
-        <p:txBody>
           <a:bodyPr/>
           <a:lstStyle/>
           <a:p>
             <a:r>
               <a:rPr lang="en-US" dirty="0" smtClean="0"/>
-              <a:t>The process model</a:t>
+              <a:t>Problem Overview</a:t>
+            </a:r>
+            <a:endParaRPr lang="en-US" dirty="0"/>
+          </a:p>
+        </p:txBody>
+      </p:sp>
+      <p:sp>
+        <p:nvSpPr>
+          <p:cNvPr id="3" name="Content Placeholder 2"/>
+          <p:cNvSpPr>
+            <a:spLocks noGrp="1"/>
+          </p:cNvSpPr>
+          <p:nvPr>
+            <p:ph idx="1"/>
+          </p:nvPr>
+        </p:nvSpPr>
+        <p:spPr/>
+        <p:txBody>
+          <a:bodyPr/>
+          <a:lstStyle/>
+          <a:p>
+            <a:r>
+              <a:rPr lang="en-US" dirty="0" smtClean="0"/>
+              <a:t>Ahmed, you got this</a:t>
             </a:r>
             <a:endParaRPr lang="en-US" dirty="0"/>
           </a:p>
@@ -4446,13 +4301,20 @@
     </p:spTree>
     <p:extLst>
       <p:ext uri="{BB962C8B-B14F-4D97-AF65-F5344CB8AC3E}">
-        <p14:creationId xmlns:p14="http://schemas.microsoft.com/office/powerpoint/2010/main" val="2084027435"/>
+        <p14:creationId xmlns:p14="http://schemas.microsoft.com/office/powerpoint/2010/main" val="1326059528"/>
       </p:ext>
     </p:extLst>
   </p:cSld>
   <p:clrMapOvr>
     <a:masterClrMapping/>
   </p:clrMapOvr>
+  <p:timing>
+    <p:tnLst>
+      <p:par>
+        <p:cTn xmlns:p14="http://schemas.microsoft.com/office/powerpoint/2010/main" id="1" dur="indefinite" restart="never" nodeType="tmRoot"/>
+      </p:par>
+    </p:tnLst>
+  </p:timing>
 </p:sld>
 </file>
 
@@ -4485,54 +4347,77 @@
         </p:nvSpPr>
         <p:spPr/>
         <p:txBody>
+          <a:bodyPr>
+            <a:normAutofit/>
+          </a:bodyPr>
+          <a:lstStyle/>
+          <a:p>
+            <a:pPr algn="ctr"/>
+            <a:r>
+              <a:rPr lang="en-US" dirty="0" smtClean="0"/>
+              <a:t>Process Model</a:t>
+            </a:r>
+            <a:endParaRPr lang="en-US" dirty="0"/>
+          </a:p>
+        </p:txBody>
+      </p:sp>
+      <p:sp>
+        <p:nvSpPr>
+          <p:cNvPr id="3" name="Content Placeholder 2"/>
+          <p:cNvSpPr>
+            <a:spLocks noGrp="1"/>
+          </p:cNvSpPr>
+          <p:nvPr>
+            <p:ph idx="1"/>
+          </p:nvPr>
+        </p:nvSpPr>
+        <p:spPr/>
+        <p:txBody>
           <a:bodyPr/>
           <a:lstStyle/>
           <a:p>
             <a:r>
               <a:rPr lang="en-US" dirty="0" smtClean="0"/>
-              <a:t>Problem Overview</a:t>
-            </a:r>
+              <a:t>Iterative and Incremental</a:t>
+            </a:r>
+          </a:p>
+          <a:p>
+            <a:pPr lvl="1"/>
+            <a:r>
+              <a:rPr lang="en-US" dirty="0" smtClean="0"/>
+              <a:t>Functional products after short time</a:t>
+            </a:r>
+          </a:p>
+          <a:p>
+            <a:pPr lvl="1"/>
+            <a:r>
+              <a:rPr lang="en-US" dirty="0" smtClean="0"/>
+              <a:t>Room for low-cost maintenance</a:t>
+            </a:r>
+          </a:p>
+          <a:p>
+            <a:pPr lvl="1"/>
             <a:endParaRPr lang="en-US" dirty="0"/>
-          </a:p>
-        </p:txBody>
-      </p:sp>
-      <p:sp>
-        <p:nvSpPr>
-          <p:cNvPr id="3" name="Content Placeholder 2"/>
-          <p:cNvSpPr>
-            <a:spLocks noGrp="1"/>
-          </p:cNvSpPr>
-          <p:nvPr>
-            <p:ph idx="1"/>
-          </p:nvPr>
-        </p:nvSpPr>
-        <p:spPr/>
-        <p:txBody>
-          <a:bodyPr/>
-          <a:lstStyle/>
-          <a:p>
-            <a:r>
-              <a:rPr lang="en-US" dirty="0" smtClean="0"/>
-              <a:t>Ahmed, you </a:t>
-            </a:r>
-            <a:r>
-              <a:rPr lang="en-US" smtClean="0"/>
-              <a:t>got this</a:t>
-            </a:r>
-            <a:endParaRPr lang="en-US"/>
           </a:p>
         </p:txBody>
       </p:sp>
     </p:spTree>
     <p:extLst>
       <p:ext uri="{BB962C8B-B14F-4D97-AF65-F5344CB8AC3E}">
-        <p14:creationId xmlns:p14="http://schemas.microsoft.com/office/powerpoint/2010/main" val="1326059528"/>
+        <p14:creationId xmlns:p14="http://schemas.microsoft.com/office/powerpoint/2010/main" val="2084027435"/>
       </p:ext>
     </p:extLst>
   </p:cSld>
   <p:clrMapOvr>
     <a:masterClrMapping/>
   </p:clrMapOvr>
+  <p:timing>
+    <p:tnLst>
+      <p:par>
+        <p:cTn xmlns:p14="http://schemas.microsoft.com/office/powerpoint/2010/main" id="1" dur="indefinite" restart="never" nodeType="tmRoot"/>
+      </p:par>
+    </p:tnLst>
+  </p:timing>
 </p:sld>
 </file>
 
@@ -4568,9 +4453,10 @@
           <a:bodyPr/>
           <a:lstStyle/>
           <a:p>
+            <a:pPr algn="ctr"/>
             <a:r>
               <a:rPr lang="en-US" dirty="0" smtClean="0"/>
-              <a:t>Planning 2</a:t>
+              <a:t>Planning</a:t>
             </a:r>
             <a:endParaRPr lang="en-US" dirty="0"/>
           </a:p>
@@ -4609,6 +4495,13 @@
   <p:clrMapOvr>
     <a:masterClrMapping/>
   </p:clrMapOvr>
+  <p:timing>
+    <p:tnLst>
+      <p:par>
+        <p:cTn xmlns:p14="http://schemas.microsoft.com/office/powerpoint/2010/main" id="1" dur="indefinite" restart="never" nodeType="tmRoot"/>
+      </p:par>
+    </p:tnLst>
+  </p:timing>
 </p:sld>
 </file>
 
@@ -4646,9 +4539,10 @@
           </a:bodyPr>
           <a:lstStyle/>
           <a:p>
+            <a:pPr algn="ctr"/>
             <a:r>
               <a:rPr lang="en-US" dirty="0" smtClean="0"/>
-              <a:t>Requirements 1</a:t>
+              <a:t>Risk Analysis</a:t>
             </a:r>
             <a:endParaRPr lang="en-US" dirty="0"/>
           </a:p>
@@ -4664,25 +4558,2719 @@
             <p:ph idx="1"/>
           </p:nvPr>
         </p:nvSpPr>
-        <p:spPr/>
+        <p:spPr>
+          <a:solidFill>
+            <a:schemeClr val="tx1"/>
+          </a:solidFill>
+        </p:spPr>
         <p:txBody>
           <a:bodyPr/>
           <a:lstStyle/>
           <a:p>
-            <a:endParaRPr lang="en-US"/>
-          </a:p>
-        </p:txBody>
-      </p:sp>
+            <a:pPr marL="36576" indent="0">
+              <a:buNone/>
+            </a:pPr>
+            <a:r>
+              <a:rPr lang="en-US" dirty="0" smtClean="0"/>
+              <a:t>Risk Analysis</a:t>
+            </a:r>
+            <a:endParaRPr lang="en-US" dirty="0"/>
+          </a:p>
+        </p:txBody>
+      </p:sp>
+      <p:graphicFrame>
+        <p:nvGraphicFramePr>
+          <p:cNvPr id="4" name="Table 3"/>
+          <p:cNvGraphicFramePr>
+            <a:graphicFrameLocks noGrp="1"/>
+          </p:cNvGraphicFramePr>
+          <p:nvPr>
+            <p:extLst>
+              <p:ext uri="{D42A27DB-BD31-4B8C-83A1-F6EECF244321}">
+                <p14:modId xmlns:p14="http://schemas.microsoft.com/office/powerpoint/2010/main" val="3362595770"/>
+              </p:ext>
+            </p:extLst>
+          </p:nvPr>
+        </p:nvGraphicFramePr>
+        <p:xfrm>
+          <a:off x="457200" y="1600198"/>
+          <a:ext cx="7467598" cy="4525965"/>
+        </p:xfrm>
+        <a:graphic>
+          <a:graphicData uri="http://schemas.openxmlformats.org/drawingml/2006/table">
+            <a:tbl>
+              <a:tblPr/>
+              <a:tblGrid>
+                <a:gridCol w="845388"/>
+                <a:gridCol w="1113095"/>
+                <a:gridCol w="1113095"/>
+                <a:gridCol w="1169454"/>
+                <a:gridCol w="1169454"/>
+                <a:gridCol w="1028556"/>
+                <a:gridCol w="1028556"/>
+              </a:tblGrid>
+              <a:tr h="323050">
+                <a:tc gridSpan="7">
+                  <a:txBody>
+                    <a:bodyPr/>
+                    <a:lstStyle/>
+                    <a:p>
+                      <a:pPr algn="ctr" fontAlgn="ctr"/>
+                      <a:r>
+                        <a:rPr lang="en-US" sz="1900" b="0" i="0" u="none" strike="noStrike" dirty="0">
+                          <a:solidFill>
+                            <a:srgbClr val="000000"/>
+                          </a:solidFill>
+                          <a:effectLst/>
+                          <a:latin typeface="Calibri"/>
+                        </a:rPr>
+                        <a:t>Risk Assessment Summary</a:t>
+                      </a:r>
+                    </a:p>
+                  </a:txBody>
+                  <a:tcPr marL="10137" marR="10137" marT="10137" marB="0" anchor="ctr">
+                    <a:lnL w="19050" cap="flat" cmpd="sng" algn="ctr">
+                      <a:solidFill>
+                        <a:srgbClr val="000000"/>
+                      </a:solidFill>
+                      <a:prstDash val="solid"/>
+                      <a:round/>
+                      <a:headEnd type="none" w="med" len="med"/>
+                      <a:tailEnd type="none" w="med" len="med"/>
+                    </a:lnL>
+                    <a:lnR w="19050" cap="flat" cmpd="sng" algn="ctr">
+                      <a:solidFill>
+                        <a:srgbClr val="000000"/>
+                      </a:solidFill>
+                      <a:prstDash val="solid"/>
+                      <a:round/>
+                      <a:headEnd type="none" w="med" len="med"/>
+                      <a:tailEnd type="none" w="med" len="med"/>
+                    </a:lnR>
+                    <a:lnT w="19050" cap="flat" cmpd="sng" algn="ctr">
+                      <a:solidFill>
+                        <a:srgbClr val="000000"/>
+                      </a:solidFill>
+                      <a:prstDash val="solid"/>
+                      <a:round/>
+                      <a:headEnd type="none" w="med" len="med"/>
+                      <a:tailEnd type="none" w="med" len="med"/>
+                    </a:lnT>
+                    <a:lnB w="19050" cap="flat" cmpd="sng" algn="ctr">
+                      <a:solidFill>
+                        <a:srgbClr val="000000"/>
+                      </a:solidFill>
+                      <a:prstDash val="solid"/>
+                      <a:round/>
+                      <a:headEnd type="none" w="med" len="med"/>
+                      <a:tailEnd type="none" w="med" len="med"/>
+                    </a:lnB>
+                  </a:tcPr>
+                </a:tc>
+                <a:tc hMerge="1">
+                  <a:txBody>
+                    <a:bodyPr/>
+                    <a:lstStyle/>
+                    <a:p>
+                      <a:endParaRPr lang="en-US"/>
+                    </a:p>
+                  </a:txBody>
+                  <a:tcPr/>
+                </a:tc>
+                <a:tc hMerge="1">
+                  <a:txBody>
+                    <a:bodyPr/>
+                    <a:lstStyle/>
+                    <a:p>
+                      <a:endParaRPr lang="en-US"/>
+                    </a:p>
+                  </a:txBody>
+                  <a:tcPr/>
+                </a:tc>
+                <a:tc hMerge="1">
+                  <a:txBody>
+                    <a:bodyPr/>
+                    <a:lstStyle/>
+                    <a:p>
+                      <a:endParaRPr lang="en-US"/>
+                    </a:p>
+                  </a:txBody>
+                  <a:tcPr/>
+                </a:tc>
+                <a:tc hMerge="1">
+                  <a:txBody>
+                    <a:bodyPr/>
+                    <a:lstStyle/>
+                    <a:p>
+                      <a:endParaRPr lang="en-US"/>
+                    </a:p>
+                  </a:txBody>
+                  <a:tcPr/>
+                </a:tc>
+                <a:tc hMerge="1">
+                  <a:txBody>
+                    <a:bodyPr/>
+                    <a:lstStyle/>
+                    <a:p>
+                      <a:endParaRPr lang="en-US"/>
+                    </a:p>
+                  </a:txBody>
+                  <a:tcPr/>
+                </a:tc>
+                <a:tc hMerge="1">
+                  <a:txBody>
+                    <a:bodyPr/>
+                    <a:lstStyle/>
+                    <a:p>
+                      <a:endParaRPr lang="en-US"/>
+                    </a:p>
+                  </a:txBody>
+                  <a:tcPr/>
+                </a:tc>
+              </a:tr>
+              <a:tr h="480763">
+                <a:tc rowSpan="5">
+                  <a:txBody>
+                    <a:bodyPr/>
+                    <a:lstStyle/>
+                    <a:p>
+                      <a:pPr algn="ctr" fontAlgn="ctr"/>
+                      <a:r>
+                        <a:rPr lang="en-US" sz="900" b="0" i="0" u="none" strike="noStrike">
+                          <a:solidFill>
+                            <a:srgbClr val="000000"/>
+                          </a:solidFill>
+                          <a:effectLst/>
+                          <a:latin typeface="Calibri"/>
+                        </a:rPr>
+                        <a:t>Probability of Risk Occurance </a:t>
+                      </a:r>
+                    </a:p>
+                  </a:txBody>
+                  <a:tcPr marL="10137" marR="10137" marT="10137" marB="0" anchor="ctr">
+                    <a:lnL w="19050" cap="flat" cmpd="sng" algn="ctr">
+                      <a:solidFill>
+                        <a:srgbClr val="000000"/>
+                      </a:solidFill>
+                      <a:prstDash val="solid"/>
+                      <a:round/>
+                      <a:headEnd type="none" w="med" len="med"/>
+                      <a:tailEnd type="none" w="med" len="med"/>
+                    </a:lnL>
+                    <a:lnR w="19050" cap="flat" cmpd="sng" algn="ctr">
+                      <a:solidFill>
+                        <a:srgbClr val="000000"/>
+                      </a:solidFill>
+                      <a:prstDash val="solid"/>
+                      <a:round/>
+                      <a:headEnd type="none" w="med" len="med"/>
+                      <a:tailEnd type="none" w="med" len="med"/>
+                    </a:lnR>
+                    <a:lnT w="19050" cap="flat" cmpd="sng" algn="ctr">
+                      <a:solidFill>
+                        <a:srgbClr val="000000"/>
+                      </a:solidFill>
+                      <a:prstDash val="solid"/>
+                      <a:round/>
+                      <a:headEnd type="none" w="med" len="med"/>
+                      <a:tailEnd type="none" w="med" len="med"/>
+                    </a:lnT>
+                    <a:lnB w="19050" cap="flat" cmpd="sng" algn="ctr">
+                      <a:solidFill>
+                        <a:srgbClr val="000000"/>
+                      </a:solidFill>
+                      <a:prstDash val="solid"/>
+                      <a:round/>
+                      <a:headEnd type="none" w="med" len="med"/>
+                      <a:tailEnd type="none" w="med" len="med"/>
+                    </a:lnB>
+                  </a:tcPr>
+                </a:tc>
+                <a:tc>
+                  <a:txBody>
+                    <a:bodyPr/>
+                    <a:lstStyle/>
+                    <a:p>
+                      <a:pPr algn="ctr" fontAlgn="ctr"/>
+                      <a:r>
+                        <a:rPr lang="en-US" sz="900" b="0" i="0" u="none" strike="noStrike">
+                          <a:solidFill>
+                            <a:srgbClr val="000000"/>
+                          </a:solidFill>
+                          <a:effectLst/>
+                          <a:latin typeface="Calibri"/>
+                        </a:rPr>
+                        <a:t>High</a:t>
+                      </a:r>
+                    </a:p>
+                  </a:txBody>
+                  <a:tcPr marL="10137" marR="10137" marT="10137" marB="0" anchor="ctr">
+                    <a:lnL w="19050" cap="flat" cmpd="sng" algn="ctr">
+                      <a:solidFill>
+                        <a:srgbClr val="000000"/>
+                      </a:solidFill>
+                      <a:prstDash val="solid"/>
+                      <a:round/>
+                      <a:headEnd type="none" w="med" len="med"/>
+                      <a:tailEnd type="none" w="med" len="med"/>
+                    </a:lnL>
+                    <a:lnR w="19050" cap="flat" cmpd="sng" algn="ctr">
+                      <a:solidFill>
+                        <a:srgbClr val="000000"/>
+                      </a:solidFill>
+                      <a:prstDash val="solid"/>
+                      <a:round/>
+                      <a:headEnd type="none" w="med" len="med"/>
+                      <a:tailEnd type="none" w="med" len="med"/>
+                    </a:lnR>
+                    <a:lnT w="19050" cap="flat" cmpd="sng" algn="ctr">
+                      <a:solidFill>
+                        <a:srgbClr val="000000"/>
+                      </a:solidFill>
+                      <a:prstDash val="solid"/>
+                      <a:round/>
+                      <a:headEnd type="none" w="med" len="med"/>
+                      <a:tailEnd type="none" w="med" len="med"/>
+                    </a:lnT>
+                    <a:lnB w="19050" cap="flat" cmpd="sng" algn="ctr">
+                      <a:solidFill>
+                        <a:srgbClr val="000000"/>
+                      </a:solidFill>
+                      <a:prstDash val="solid"/>
+                      <a:round/>
+                      <a:headEnd type="none" w="med" len="med"/>
+                      <a:tailEnd type="none" w="med" len="med"/>
+                    </a:lnB>
+                  </a:tcPr>
+                </a:tc>
+                <a:tc>
+                  <a:txBody>
+                    <a:bodyPr/>
+                    <a:lstStyle/>
+                    <a:p>
+                      <a:pPr algn="l" fontAlgn="t"/>
+                      <a:r>
+                        <a:rPr lang="en-US" sz="900" b="0" i="0" u="none" strike="noStrike">
+                          <a:solidFill>
+                            <a:srgbClr val="000000"/>
+                          </a:solidFill>
+                          <a:effectLst/>
+                          <a:latin typeface="Calibri"/>
+                        </a:rPr>
+                        <a:t> </a:t>
+                      </a:r>
+                    </a:p>
+                  </a:txBody>
+                  <a:tcPr marL="10137" marR="10137" marT="10137" marB="0">
+                    <a:lnL w="19050" cap="flat" cmpd="sng" algn="ctr">
+                      <a:solidFill>
+                        <a:srgbClr val="000000"/>
+                      </a:solidFill>
+                      <a:prstDash val="solid"/>
+                      <a:round/>
+                      <a:headEnd type="none" w="med" len="med"/>
+                      <a:tailEnd type="none" w="med" len="med"/>
+                    </a:lnL>
+                    <a:lnR w="19050" cap="flat" cmpd="sng" algn="ctr">
+                      <a:solidFill>
+                        <a:srgbClr val="000000"/>
+                      </a:solidFill>
+                      <a:prstDash val="solid"/>
+                      <a:round/>
+                      <a:headEnd type="none" w="med" len="med"/>
+                      <a:tailEnd type="none" w="med" len="med"/>
+                    </a:lnR>
+                    <a:lnT w="19050" cap="flat" cmpd="sng" algn="ctr">
+                      <a:solidFill>
+                        <a:srgbClr val="000000"/>
+                      </a:solidFill>
+                      <a:prstDash val="solid"/>
+                      <a:round/>
+                      <a:headEnd type="none" w="med" len="med"/>
+                      <a:tailEnd type="none" w="med" len="med"/>
+                    </a:lnT>
+                    <a:lnB w="19050" cap="flat" cmpd="sng" algn="ctr">
+                      <a:solidFill>
+                        <a:srgbClr val="000000"/>
+                      </a:solidFill>
+                      <a:prstDash val="solid"/>
+                      <a:round/>
+                      <a:headEnd type="none" w="med" len="med"/>
+                      <a:tailEnd type="none" w="med" len="med"/>
+                    </a:lnB>
+                    <a:solidFill>
+                      <a:srgbClr val="FFFF00"/>
+                    </a:solidFill>
+                  </a:tcPr>
+                </a:tc>
+                <a:tc>
+                  <a:txBody>
+                    <a:bodyPr/>
+                    <a:lstStyle/>
+                    <a:p>
+                      <a:pPr algn="l" fontAlgn="t"/>
+                      <a:r>
+                        <a:rPr lang="en-US" sz="900" b="0" i="0" u="none" strike="noStrike">
+                          <a:solidFill>
+                            <a:srgbClr val="000000"/>
+                          </a:solidFill>
+                          <a:effectLst/>
+                          <a:latin typeface="Calibri"/>
+                        </a:rPr>
+                        <a:t> </a:t>
+                      </a:r>
+                    </a:p>
+                  </a:txBody>
+                  <a:tcPr marL="10137" marR="10137" marT="10137" marB="0">
+                    <a:lnL w="19050" cap="flat" cmpd="sng" algn="ctr">
+                      <a:solidFill>
+                        <a:srgbClr val="000000"/>
+                      </a:solidFill>
+                      <a:prstDash val="solid"/>
+                      <a:round/>
+                      <a:headEnd type="none" w="med" len="med"/>
+                      <a:tailEnd type="none" w="med" len="med"/>
+                    </a:lnL>
+                    <a:lnR w="19050" cap="flat" cmpd="sng" algn="ctr">
+                      <a:solidFill>
+                        <a:srgbClr val="000000"/>
+                      </a:solidFill>
+                      <a:prstDash val="solid"/>
+                      <a:round/>
+                      <a:headEnd type="none" w="med" len="med"/>
+                      <a:tailEnd type="none" w="med" len="med"/>
+                    </a:lnR>
+                    <a:lnT w="19050" cap="flat" cmpd="sng" algn="ctr">
+                      <a:solidFill>
+                        <a:srgbClr val="000000"/>
+                      </a:solidFill>
+                      <a:prstDash val="solid"/>
+                      <a:round/>
+                      <a:headEnd type="none" w="med" len="med"/>
+                      <a:tailEnd type="none" w="med" len="med"/>
+                    </a:lnT>
+                    <a:lnB w="19050" cap="flat" cmpd="sng" algn="ctr">
+                      <a:solidFill>
+                        <a:srgbClr val="000000"/>
+                      </a:solidFill>
+                      <a:prstDash val="solid"/>
+                      <a:round/>
+                      <a:headEnd type="none" w="med" len="med"/>
+                      <a:tailEnd type="none" w="med" len="med"/>
+                    </a:lnB>
+                    <a:solidFill>
+                      <a:srgbClr val="FFFF00"/>
+                    </a:solidFill>
+                  </a:tcPr>
+                </a:tc>
+                <a:tc>
+                  <a:txBody>
+                    <a:bodyPr/>
+                    <a:lstStyle/>
+                    <a:p>
+                      <a:pPr algn="l" fontAlgn="t"/>
+                      <a:r>
+                        <a:rPr lang="en-US" sz="900" b="0" i="0" u="none" strike="noStrike">
+                          <a:solidFill>
+                            <a:srgbClr val="000000"/>
+                          </a:solidFill>
+                          <a:effectLst/>
+                          <a:latin typeface="Calibri"/>
+                        </a:rPr>
+                        <a:t>-Inaccurate Project Timeline</a:t>
+                      </a:r>
+                    </a:p>
+                  </a:txBody>
+                  <a:tcPr marL="10137" marR="10137" marT="10137" marB="0">
+                    <a:lnL w="19050" cap="flat" cmpd="sng" algn="ctr">
+                      <a:solidFill>
+                        <a:srgbClr val="000000"/>
+                      </a:solidFill>
+                      <a:prstDash val="solid"/>
+                      <a:round/>
+                      <a:headEnd type="none" w="med" len="med"/>
+                      <a:tailEnd type="none" w="med" len="med"/>
+                    </a:lnL>
+                    <a:lnR w="19050" cap="flat" cmpd="sng" algn="ctr">
+                      <a:solidFill>
+                        <a:srgbClr val="000000"/>
+                      </a:solidFill>
+                      <a:prstDash val="solid"/>
+                      <a:round/>
+                      <a:headEnd type="none" w="med" len="med"/>
+                      <a:tailEnd type="none" w="med" len="med"/>
+                    </a:lnR>
+                    <a:lnT w="19050" cap="flat" cmpd="sng" algn="ctr">
+                      <a:solidFill>
+                        <a:srgbClr val="000000"/>
+                      </a:solidFill>
+                      <a:prstDash val="solid"/>
+                      <a:round/>
+                      <a:headEnd type="none" w="med" len="med"/>
+                      <a:tailEnd type="none" w="med" len="med"/>
+                    </a:lnT>
+                    <a:lnB w="19050" cap="flat" cmpd="sng" algn="ctr">
+                      <a:solidFill>
+                        <a:srgbClr val="000000"/>
+                      </a:solidFill>
+                      <a:prstDash val="solid"/>
+                      <a:round/>
+                      <a:headEnd type="none" w="med" len="med"/>
+                      <a:tailEnd type="none" w="med" len="med"/>
+                    </a:lnB>
+                    <a:solidFill>
+                      <a:srgbClr val="FFC000"/>
+                    </a:solidFill>
+                  </a:tcPr>
+                </a:tc>
+                <a:tc>
+                  <a:txBody>
+                    <a:bodyPr/>
+                    <a:lstStyle/>
+                    <a:p>
+                      <a:pPr algn="l" fontAlgn="t"/>
+                      <a:r>
+                        <a:rPr lang="en-US" sz="900" b="0" i="0" u="none" strike="noStrike">
+                          <a:solidFill>
+                            <a:srgbClr val="000000"/>
+                          </a:solidFill>
+                          <a:effectLst/>
+                          <a:latin typeface="Calibri"/>
+                        </a:rPr>
+                        <a:t>-Incorrect Specification</a:t>
+                      </a:r>
+                    </a:p>
+                  </a:txBody>
+                  <a:tcPr marL="10137" marR="10137" marT="10137" marB="0">
+                    <a:lnL w="19050" cap="flat" cmpd="sng" algn="ctr">
+                      <a:solidFill>
+                        <a:srgbClr val="000000"/>
+                      </a:solidFill>
+                      <a:prstDash val="solid"/>
+                      <a:round/>
+                      <a:headEnd type="none" w="med" len="med"/>
+                      <a:tailEnd type="none" w="med" len="med"/>
+                    </a:lnL>
+                    <a:lnR w="19050" cap="flat" cmpd="sng" algn="ctr">
+                      <a:solidFill>
+                        <a:srgbClr val="000000"/>
+                      </a:solidFill>
+                      <a:prstDash val="solid"/>
+                      <a:round/>
+                      <a:headEnd type="none" w="med" len="med"/>
+                      <a:tailEnd type="none" w="med" len="med"/>
+                    </a:lnR>
+                    <a:lnT w="19050" cap="flat" cmpd="sng" algn="ctr">
+                      <a:solidFill>
+                        <a:srgbClr val="000000"/>
+                      </a:solidFill>
+                      <a:prstDash val="solid"/>
+                      <a:round/>
+                      <a:headEnd type="none" w="med" len="med"/>
+                      <a:tailEnd type="none" w="med" len="med"/>
+                    </a:lnT>
+                    <a:lnB w="19050" cap="flat" cmpd="sng" algn="ctr">
+                      <a:solidFill>
+                        <a:srgbClr val="000000"/>
+                      </a:solidFill>
+                      <a:prstDash val="solid"/>
+                      <a:round/>
+                      <a:headEnd type="none" w="med" len="med"/>
+                      <a:tailEnd type="none" w="med" len="med"/>
+                    </a:lnB>
+                    <a:solidFill>
+                      <a:srgbClr val="FF0000"/>
+                    </a:solidFill>
+                  </a:tcPr>
+                </a:tc>
+                <a:tc>
+                  <a:txBody>
+                    <a:bodyPr/>
+                    <a:lstStyle/>
+                    <a:p>
+                      <a:pPr algn="l" fontAlgn="t"/>
+                      <a:r>
+                        <a:rPr lang="en-US" sz="900" b="0" i="0" u="none" strike="noStrike">
+                          <a:solidFill>
+                            <a:srgbClr val="000000"/>
+                          </a:solidFill>
+                          <a:effectLst/>
+                          <a:latin typeface="Calibri"/>
+                        </a:rPr>
+                        <a:t>-Scheduling Conflicts</a:t>
+                      </a:r>
+                      <a:br>
+                        <a:rPr lang="en-US" sz="900" b="0" i="0" u="none" strike="noStrike">
+                          <a:solidFill>
+                            <a:srgbClr val="000000"/>
+                          </a:solidFill>
+                          <a:effectLst/>
+                          <a:latin typeface="Calibri"/>
+                        </a:rPr>
+                      </a:br>
+                      <a:endParaRPr lang="en-US" sz="900" b="0" i="0" u="none" strike="noStrike">
+                        <a:solidFill>
+                          <a:srgbClr val="000000"/>
+                        </a:solidFill>
+                        <a:effectLst/>
+                        <a:latin typeface="Calibri"/>
+                      </a:endParaRPr>
+                    </a:p>
+                  </a:txBody>
+                  <a:tcPr marL="10137" marR="10137" marT="10137" marB="0">
+                    <a:lnL w="19050" cap="flat" cmpd="sng" algn="ctr">
+                      <a:solidFill>
+                        <a:srgbClr val="000000"/>
+                      </a:solidFill>
+                      <a:prstDash val="solid"/>
+                      <a:round/>
+                      <a:headEnd type="none" w="med" len="med"/>
+                      <a:tailEnd type="none" w="med" len="med"/>
+                    </a:lnL>
+                    <a:lnR w="19050" cap="flat" cmpd="sng" algn="ctr">
+                      <a:solidFill>
+                        <a:srgbClr val="000000"/>
+                      </a:solidFill>
+                      <a:prstDash val="solid"/>
+                      <a:round/>
+                      <a:headEnd type="none" w="med" len="med"/>
+                      <a:tailEnd type="none" w="med" len="med"/>
+                    </a:lnR>
+                    <a:lnT w="19050" cap="flat" cmpd="sng" algn="ctr">
+                      <a:solidFill>
+                        <a:srgbClr val="000000"/>
+                      </a:solidFill>
+                      <a:prstDash val="solid"/>
+                      <a:round/>
+                      <a:headEnd type="none" w="med" len="med"/>
+                      <a:tailEnd type="none" w="med" len="med"/>
+                    </a:lnT>
+                    <a:lnB w="19050" cap="flat" cmpd="sng" algn="ctr">
+                      <a:solidFill>
+                        <a:srgbClr val="000000"/>
+                      </a:solidFill>
+                      <a:prstDash val="solid"/>
+                      <a:round/>
+                      <a:headEnd type="none" w="med" len="med"/>
+                      <a:tailEnd type="none" w="med" len="med"/>
+                    </a:lnB>
+                    <a:solidFill>
+                      <a:srgbClr val="FF0000"/>
+                    </a:solidFill>
+                  </a:tcPr>
+                </a:tc>
+              </a:tr>
+              <a:tr h="750167">
+                <a:tc vMerge="1">
+                  <a:txBody>
+                    <a:bodyPr/>
+                    <a:lstStyle/>
+                    <a:p>
+                      <a:endParaRPr lang="en-US"/>
+                    </a:p>
+                  </a:txBody>
+                  <a:tcPr/>
+                </a:tc>
+                <a:tc>
+                  <a:txBody>
+                    <a:bodyPr/>
+                    <a:lstStyle/>
+                    <a:p>
+                      <a:pPr algn="ctr" fontAlgn="ctr"/>
+                      <a:r>
+                        <a:rPr lang="en-US" sz="900" b="0" i="0" u="none" strike="noStrike">
+                          <a:solidFill>
+                            <a:srgbClr val="000000"/>
+                          </a:solidFill>
+                          <a:effectLst/>
+                          <a:latin typeface="Calibri"/>
+                        </a:rPr>
+                        <a:t>Medium-High</a:t>
+                      </a:r>
+                    </a:p>
+                  </a:txBody>
+                  <a:tcPr marL="10137" marR="10137" marT="10137" marB="0" anchor="ctr">
+                    <a:lnL w="19050" cap="flat" cmpd="sng" algn="ctr">
+                      <a:solidFill>
+                        <a:srgbClr val="000000"/>
+                      </a:solidFill>
+                      <a:prstDash val="solid"/>
+                      <a:round/>
+                      <a:headEnd type="none" w="med" len="med"/>
+                      <a:tailEnd type="none" w="med" len="med"/>
+                    </a:lnL>
+                    <a:lnR w="19050" cap="flat" cmpd="sng" algn="ctr">
+                      <a:solidFill>
+                        <a:srgbClr val="000000"/>
+                      </a:solidFill>
+                      <a:prstDash val="solid"/>
+                      <a:round/>
+                      <a:headEnd type="none" w="med" len="med"/>
+                      <a:tailEnd type="none" w="med" len="med"/>
+                    </a:lnR>
+                    <a:lnT w="19050" cap="flat" cmpd="sng" algn="ctr">
+                      <a:solidFill>
+                        <a:srgbClr val="000000"/>
+                      </a:solidFill>
+                      <a:prstDash val="solid"/>
+                      <a:round/>
+                      <a:headEnd type="none" w="med" len="med"/>
+                      <a:tailEnd type="none" w="med" len="med"/>
+                    </a:lnT>
+                    <a:lnB w="19050" cap="flat" cmpd="sng" algn="ctr">
+                      <a:solidFill>
+                        <a:srgbClr val="000000"/>
+                      </a:solidFill>
+                      <a:prstDash val="solid"/>
+                      <a:round/>
+                      <a:headEnd type="none" w="med" len="med"/>
+                      <a:tailEnd type="none" w="med" len="med"/>
+                    </a:lnB>
+                  </a:tcPr>
+                </a:tc>
+                <a:tc>
+                  <a:txBody>
+                    <a:bodyPr/>
+                    <a:lstStyle/>
+                    <a:p>
+                      <a:pPr algn="l" fontAlgn="t"/>
+                      <a:r>
+                        <a:rPr lang="en-US" sz="900" b="0" i="0" u="none" strike="noStrike">
+                          <a:solidFill>
+                            <a:srgbClr val="000000"/>
+                          </a:solidFill>
+                          <a:effectLst/>
+                          <a:latin typeface="Calibri"/>
+                        </a:rPr>
+                        <a:t>-Overlapping of Artifact creation/Duplication of work</a:t>
+                      </a:r>
+                    </a:p>
+                  </a:txBody>
+                  <a:tcPr marL="10137" marR="10137" marT="10137" marB="0">
+                    <a:lnL w="19050" cap="flat" cmpd="sng" algn="ctr">
+                      <a:solidFill>
+                        <a:srgbClr val="000000"/>
+                      </a:solidFill>
+                      <a:prstDash val="solid"/>
+                      <a:round/>
+                      <a:headEnd type="none" w="med" len="med"/>
+                      <a:tailEnd type="none" w="med" len="med"/>
+                    </a:lnL>
+                    <a:lnR w="19050" cap="flat" cmpd="sng" algn="ctr">
+                      <a:solidFill>
+                        <a:srgbClr val="000000"/>
+                      </a:solidFill>
+                      <a:prstDash val="solid"/>
+                      <a:round/>
+                      <a:headEnd type="none" w="med" len="med"/>
+                      <a:tailEnd type="none" w="med" len="med"/>
+                    </a:lnR>
+                    <a:lnT w="19050" cap="flat" cmpd="sng" algn="ctr">
+                      <a:solidFill>
+                        <a:srgbClr val="000000"/>
+                      </a:solidFill>
+                      <a:prstDash val="solid"/>
+                      <a:round/>
+                      <a:headEnd type="none" w="med" len="med"/>
+                      <a:tailEnd type="none" w="med" len="med"/>
+                    </a:lnT>
+                    <a:lnB w="19050" cap="flat" cmpd="sng" algn="ctr">
+                      <a:solidFill>
+                        <a:srgbClr val="000000"/>
+                      </a:solidFill>
+                      <a:prstDash val="solid"/>
+                      <a:round/>
+                      <a:headEnd type="none" w="med" len="med"/>
+                      <a:tailEnd type="none" w="med" len="med"/>
+                    </a:lnB>
+                    <a:solidFill>
+                      <a:srgbClr val="FFFF00"/>
+                    </a:solidFill>
+                  </a:tcPr>
+                </a:tc>
+                <a:tc>
+                  <a:txBody>
+                    <a:bodyPr/>
+                    <a:lstStyle/>
+                    <a:p>
+                      <a:pPr algn="l" fontAlgn="t"/>
+                      <a:r>
+                        <a:rPr lang="en-US" sz="900" b="0" i="0" u="none" strike="noStrike">
+                          <a:solidFill>
+                            <a:srgbClr val="000000"/>
+                          </a:solidFill>
+                          <a:effectLst/>
+                          <a:latin typeface="Calibri"/>
+                        </a:rPr>
+                        <a:t> </a:t>
+                      </a:r>
+                    </a:p>
+                  </a:txBody>
+                  <a:tcPr marL="10137" marR="10137" marT="10137" marB="0">
+                    <a:lnL w="19050" cap="flat" cmpd="sng" algn="ctr">
+                      <a:solidFill>
+                        <a:srgbClr val="000000"/>
+                      </a:solidFill>
+                      <a:prstDash val="solid"/>
+                      <a:round/>
+                      <a:headEnd type="none" w="med" len="med"/>
+                      <a:tailEnd type="none" w="med" len="med"/>
+                    </a:lnL>
+                    <a:lnR w="19050" cap="flat" cmpd="sng" algn="ctr">
+                      <a:solidFill>
+                        <a:srgbClr val="000000"/>
+                      </a:solidFill>
+                      <a:prstDash val="solid"/>
+                      <a:round/>
+                      <a:headEnd type="none" w="med" len="med"/>
+                      <a:tailEnd type="none" w="med" len="med"/>
+                    </a:lnR>
+                    <a:lnT w="19050" cap="flat" cmpd="sng" algn="ctr">
+                      <a:solidFill>
+                        <a:srgbClr val="000000"/>
+                      </a:solidFill>
+                      <a:prstDash val="solid"/>
+                      <a:round/>
+                      <a:headEnd type="none" w="med" len="med"/>
+                      <a:tailEnd type="none" w="med" len="med"/>
+                    </a:lnT>
+                    <a:lnB w="19050" cap="flat" cmpd="sng" algn="ctr">
+                      <a:solidFill>
+                        <a:srgbClr val="000000"/>
+                      </a:solidFill>
+                      <a:prstDash val="solid"/>
+                      <a:round/>
+                      <a:headEnd type="none" w="med" len="med"/>
+                      <a:tailEnd type="none" w="med" len="med"/>
+                    </a:lnB>
+                    <a:solidFill>
+                      <a:srgbClr val="FFFF00"/>
+                    </a:solidFill>
+                  </a:tcPr>
+                </a:tc>
+                <a:tc>
+                  <a:txBody>
+                    <a:bodyPr/>
+                    <a:lstStyle/>
+                    <a:p>
+                      <a:pPr algn="l" fontAlgn="t"/>
+                      <a:r>
+                        <a:rPr lang="en-US" sz="900" b="0" i="0" u="none" strike="noStrike">
+                          <a:solidFill>
+                            <a:srgbClr val="000000"/>
+                          </a:solidFill>
+                          <a:effectLst/>
+                          <a:latin typeface="Calibri"/>
+                        </a:rPr>
+                        <a:t>-Requirements Change</a:t>
+                      </a:r>
+                    </a:p>
+                  </a:txBody>
+                  <a:tcPr marL="10137" marR="10137" marT="10137" marB="0">
+                    <a:lnL w="19050" cap="flat" cmpd="sng" algn="ctr">
+                      <a:solidFill>
+                        <a:srgbClr val="000000"/>
+                      </a:solidFill>
+                      <a:prstDash val="solid"/>
+                      <a:round/>
+                      <a:headEnd type="none" w="med" len="med"/>
+                      <a:tailEnd type="none" w="med" len="med"/>
+                    </a:lnL>
+                    <a:lnR w="19050" cap="flat" cmpd="sng" algn="ctr">
+                      <a:solidFill>
+                        <a:srgbClr val="000000"/>
+                      </a:solidFill>
+                      <a:prstDash val="solid"/>
+                      <a:round/>
+                      <a:headEnd type="none" w="med" len="med"/>
+                      <a:tailEnd type="none" w="med" len="med"/>
+                    </a:lnR>
+                    <a:lnT w="19050" cap="flat" cmpd="sng" algn="ctr">
+                      <a:solidFill>
+                        <a:srgbClr val="000000"/>
+                      </a:solidFill>
+                      <a:prstDash val="solid"/>
+                      <a:round/>
+                      <a:headEnd type="none" w="med" len="med"/>
+                      <a:tailEnd type="none" w="med" len="med"/>
+                    </a:lnT>
+                    <a:lnB w="19050" cap="flat" cmpd="sng" algn="ctr">
+                      <a:solidFill>
+                        <a:srgbClr val="000000"/>
+                      </a:solidFill>
+                      <a:prstDash val="solid"/>
+                      <a:round/>
+                      <a:headEnd type="none" w="med" len="med"/>
+                      <a:tailEnd type="none" w="med" len="med"/>
+                    </a:lnB>
+                    <a:solidFill>
+                      <a:srgbClr val="FFFF00"/>
+                    </a:solidFill>
+                  </a:tcPr>
+                </a:tc>
+                <a:tc>
+                  <a:txBody>
+                    <a:bodyPr/>
+                    <a:lstStyle/>
+                    <a:p>
+                      <a:pPr algn="l" fontAlgn="t"/>
+                      <a:r>
+                        <a:rPr lang="en-US" sz="900" b="0" i="0" u="none" strike="noStrike">
+                          <a:solidFill>
+                            <a:srgbClr val="000000"/>
+                          </a:solidFill>
+                          <a:effectLst/>
+                          <a:latin typeface="Calibri"/>
+                        </a:rPr>
+                        <a:t>-Lack of GUI programming experience</a:t>
+                      </a:r>
+                    </a:p>
+                  </a:txBody>
+                  <a:tcPr marL="10137" marR="10137" marT="10137" marB="0">
+                    <a:lnL w="19050" cap="flat" cmpd="sng" algn="ctr">
+                      <a:solidFill>
+                        <a:srgbClr val="000000"/>
+                      </a:solidFill>
+                      <a:prstDash val="solid"/>
+                      <a:round/>
+                      <a:headEnd type="none" w="med" len="med"/>
+                      <a:tailEnd type="none" w="med" len="med"/>
+                    </a:lnL>
+                    <a:lnR w="19050" cap="flat" cmpd="sng" algn="ctr">
+                      <a:solidFill>
+                        <a:srgbClr val="000000"/>
+                      </a:solidFill>
+                      <a:prstDash val="solid"/>
+                      <a:round/>
+                      <a:headEnd type="none" w="med" len="med"/>
+                      <a:tailEnd type="none" w="med" len="med"/>
+                    </a:lnR>
+                    <a:lnT w="19050" cap="flat" cmpd="sng" algn="ctr">
+                      <a:solidFill>
+                        <a:srgbClr val="000000"/>
+                      </a:solidFill>
+                      <a:prstDash val="solid"/>
+                      <a:round/>
+                      <a:headEnd type="none" w="med" len="med"/>
+                      <a:tailEnd type="none" w="med" len="med"/>
+                    </a:lnT>
+                    <a:lnB w="19050" cap="flat" cmpd="sng" algn="ctr">
+                      <a:solidFill>
+                        <a:srgbClr val="000000"/>
+                      </a:solidFill>
+                      <a:prstDash val="solid"/>
+                      <a:round/>
+                      <a:headEnd type="none" w="med" len="med"/>
+                      <a:tailEnd type="none" w="med" len="med"/>
+                    </a:lnB>
+                    <a:solidFill>
+                      <a:srgbClr val="FFC000"/>
+                    </a:solidFill>
+                  </a:tcPr>
+                </a:tc>
+                <a:tc>
+                  <a:txBody>
+                    <a:bodyPr/>
+                    <a:lstStyle/>
+                    <a:p>
+                      <a:pPr algn="l" fontAlgn="t"/>
+                      <a:r>
+                        <a:rPr lang="en-US" sz="900" b="0" i="0" u="none" strike="noStrike">
+                          <a:solidFill>
+                            <a:srgbClr val="000000"/>
+                          </a:solidFill>
+                          <a:effectLst/>
+                          <a:latin typeface="Calibri"/>
+                        </a:rPr>
+                        <a:t> </a:t>
+                      </a:r>
+                    </a:p>
+                  </a:txBody>
+                  <a:tcPr marL="10137" marR="10137" marT="10137" marB="0">
+                    <a:lnL w="19050" cap="flat" cmpd="sng" algn="ctr">
+                      <a:solidFill>
+                        <a:srgbClr val="000000"/>
+                      </a:solidFill>
+                      <a:prstDash val="solid"/>
+                      <a:round/>
+                      <a:headEnd type="none" w="med" len="med"/>
+                      <a:tailEnd type="none" w="med" len="med"/>
+                    </a:lnL>
+                    <a:lnR w="19050" cap="flat" cmpd="sng" algn="ctr">
+                      <a:solidFill>
+                        <a:srgbClr val="000000"/>
+                      </a:solidFill>
+                      <a:prstDash val="solid"/>
+                      <a:round/>
+                      <a:headEnd type="none" w="med" len="med"/>
+                      <a:tailEnd type="none" w="med" len="med"/>
+                    </a:lnR>
+                    <a:lnT w="19050" cap="flat" cmpd="sng" algn="ctr">
+                      <a:solidFill>
+                        <a:srgbClr val="000000"/>
+                      </a:solidFill>
+                      <a:prstDash val="solid"/>
+                      <a:round/>
+                      <a:headEnd type="none" w="med" len="med"/>
+                      <a:tailEnd type="none" w="med" len="med"/>
+                    </a:lnT>
+                    <a:lnB w="19050" cap="flat" cmpd="sng" algn="ctr">
+                      <a:solidFill>
+                        <a:srgbClr val="000000"/>
+                      </a:solidFill>
+                      <a:prstDash val="solid"/>
+                      <a:round/>
+                      <a:headEnd type="none" w="med" len="med"/>
+                      <a:tailEnd type="none" w="med" len="med"/>
+                    </a:lnB>
+                    <a:solidFill>
+                      <a:srgbClr val="FF0000"/>
+                    </a:solidFill>
+                  </a:tcPr>
+                </a:tc>
+              </a:tr>
+              <a:tr h="721143">
+                <a:tc vMerge="1">
+                  <a:txBody>
+                    <a:bodyPr/>
+                    <a:lstStyle/>
+                    <a:p>
+                      <a:endParaRPr lang="en-US"/>
+                    </a:p>
+                  </a:txBody>
+                  <a:tcPr/>
+                </a:tc>
+                <a:tc>
+                  <a:txBody>
+                    <a:bodyPr/>
+                    <a:lstStyle/>
+                    <a:p>
+                      <a:pPr algn="ctr" fontAlgn="ctr"/>
+                      <a:r>
+                        <a:rPr lang="en-US" sz="900" b="0" i="0" u="none" strike="noStrike">
+                          <a:solidFill>
+                            <a:srgbClr val="000000"/>
+                          </a:solidFill>
+                          <a:effectLst/>
+                          <a:latin typeface="Calibri"/>
+                        </a:rPr>
+                        <a:t>Medium</a:t>
+                      </a:r>
+                    </a:p>
+                  </a:txBody>
+                  <a:tcPr marL="10137" marR="10137" marT="10137" marB="0" anchor="ctr">
+                    <a:lnL w="19050" cap="flat" cmpd="sng" algn="ctr">
+                      <a:solidFill>
+                        <a:srgbClr val="000000"/>
+                      </a:solidFill>
+                      <a:prstDash val="solid"/>
+                      <a:round/>
+                      <a:headEnd type="none" w="med" len="med"/>
+                      <a:tailEnd type="none" w="med" len="med"/>
+                    </a:lnL>
+                    <a:lnR w="19050" cap="flat" cmpd="sng" algn="ctr">
+                      <a:solidFill>
+                        <a:srgbClr val="000000"/>
+                      </a:solidFill>
+                      <a:prstDash val="solid"/>
+                      <a:round/>
+                      <a:headEnd type="none" w="med" len="med"/>
+                      <a:tailEnd type="none" w="med" len="med"/>
+                    </a:lnR>
+                    <a:lnT w="19050" cap="flat" cmpd="sng" algn="ctr">
+                      <a:solidFill>
+                        <a:srgbClr val="000000"/>
+                      </a:solidFill>
+                      <a:prstDash val="solid"/>
+                      <a:round/>
+                      <a:headEnd type="none" w="med" len="med"/>
+                      <a:tailEnd type="none" w="med" len="med"/>
+                    </a:lnT>
+                    <a:lnB w="19050" cap="flat" cmpd="sng" algn="ctr">
+                      <a:solidFill>
+                        <a:srgbClr val="000000"/>
+                      </a:solidFill>
+                      <a:prstDash val="solid"/>
+                      <a:round/>
+                      <a:headEnd type="none" w="med" len="med"/>
+                      <a:tailEnd type="none" w="med" len="med"/>
+                    </a:lnB>
+                  </a:tcPr>
+                </a:tc>
+                <a:tc>
+                  <a:txBody>
+                    <a:bodyPr/>
+                    <a:lstStyle/>
+                    <a:p>
+                      <a:pPr algn="l" fontAlgn="t"/>
+                      <a:r>
+                        <a:rPr lang="en-US" sz="900" b="0" i="0" u="none" strike="noStrike">
+                          <a:solidFill>
+                            <a:srgbClr val="000000"/>
+                          </a:solidFill>
+                          <a:effectLst/>
+                          <a:latin typeface="Calibri"/>
+                        </a:rPr>
+                        <a:t> </a:t>
+                      </a:r>
+                    </a:p>
+                  </a:txBody>
+                  <a:tcPr marL="10137" marR="10137" marT="10137" marB="0">
+                    <a:lnL w="19050" cap="flat" cmpd="sng" algn="ctr">
+                      <a:solidFill>
+                        <a:srgbClr val="000000"/>
+                      </a:solidFill>
+                      <a:prstDash val="solid"/>
+                      <a:round/>
+                      <a:headEnd type="none" w="med" len="med"/>
+                      <a:tailEnd type="none" w="med" len="med"/>
+                    </a:lnL>
+                    <a:lnR w="19050" cap="flat" cmpd="sng" algn="ctr">
+                      <a:solidFill>
+                        <a:srgbClr val="000000"/>
+                      </a:solidFill>
+                      <a:prstDash val="solid"/>
+                      <a:round/>
+                      <a:headEnd type="none" w="med" len="med"/>
+                      <a:tailEnd type="none" w="med" len="med"/>
+                    </a:lnR>
+                    <a:lnT w="19050" cap="flat" cmpd="sng" algn="ctr">
+                      <a:solidFill>
+                        <a:srgbClr val="000000"/>
+                      </a:solidFill>
+                      <a:prstDash val="solid"/>
+                      <a:round/>
+                      <a:headEnd type="none" w="med" len="med"/>
+                      <a:tailEnd type="none" w="med" len="med"/>
+                    </a:lnT>
+                    <a:lnB w="19050" cap="flat" cmpd="sng" algn="ctr">
+                      <a:solidFill>
+                        <a:srgbClr val="000000"/>
+                      </a:solidFill>
+                      <a:prstDash val="solid"/>
+                      <a:round/>
+                      <a:headEnd type="none" w="med" len="med"/>
+                      <a:tailEnd type="none" w="med" len="med"/>
+                    </a:lnB>
+                    <a:solidFill>
+                      <a:srgbClr val="00B050"/>
+                    </a:solidFill>
+                  </a:tcPr>
+                </a:tc>
+                <a:tc>
+                  <a:txBody>
+                    <a:bodyPr/>
+                    <a:lstStyle/>
+                    <a:p>
+                      <a:pPr algn="l" fontAlgn="t"/>
+                      <a:r>
+                        <a:rPr lang="en-US" sz="900" b="0" i="0" u="none" strike="noStrike">
+                          <a:solidFill>
+                            <a:srgbClr val="000000"/>
+                          </a:solidFill>
+                          <a:effectLst/>
+                          <a:latin typeface="Calibri"/>
+                        </a:rPr>
+                        <a:t> </a:t>
+                      </a:r>
+                    </a:p>
+                  </a:txBody>
+                  <a:tcPr marL="10137" marR="10137" marT="10137" marB="0">
+                    <a:lnL w="19050" cap="flat" cmpd="sng" algn="ctr">
+                      <a:solidFill>
+                        <a:srgbClr val="000000"/>
+                      </a:solidFill>
+                      <a:prstDash val="solid"/>
+                      <a:round/>
+                      <a:headEnd type="none" w="med" len="med"/>
+                      <a:tailEnd type="none" w="med" len="med"/>
+                    </a:lnL>
+                    <a:lnR w="19050" cap="flat" cmpd="sng" algn="ctr">
+                      <a:solidFill>
+                        <a:srgbClr val="000000"/>
+                      </a:solidFill>
+                      <a:prstDash val="solid"/>
+                      <a:round/>
+                      <a:headEnd type="none" w="med" len="med"/>
+                      <a:tailEnd type="none" w="med" len="med"/>
+                    </a:lnR>
+                    <a:lnT w="19050" cap="flat" cmpd="sng" algn="ctr">
+                      <a:solidFill>
+                        <a:srgbClr val="000000"/>
+                      </a:solidFill>
+                      <a:prstDash val="solid"/>
+                      <a:round/>
+                      <a:headEnd type="none" w="med" len="med"/>
+                      <a:tailEnd type="none" w="med" len="med"/>
+                    </a:lnT>
+                    <a:lnB w="19050" cap="flat" cmpd="sng" algn="ctr">
+                      <a:solidFill>
+                        <a:srgbClr val="000000"/>
+                      </a:solidFill>
+                      <a:prstDash val="solid"/>
+                      <a:round/>
+                      <a:headEnd type="none" w="med" len="med"/>
+                      <a:tailEnd type="none" w="med" len="med"/>
+                    </a:lnB>
+                    <a:solidFill>
+                      <a:srgbClr val="FFFF00"/>
+                    </a:solidFill>
+                  </a:tcPr>
+                </a:tc>
+                <a:tc>
+                  <a:txBody>
+                    <a:bodyPr/>
+                    <a:lstStyle/>
+                    <a:p>
+                      <a:pPr algn="l" fontAlgn="t"/>
+                      <a:r>
+                        <a:rPr lang="en-US" sz="900" b="0" i="0" u="none" strike="noStrike">
+                          <a:solidFill>
+                            <a:srgbClr val="000000"/>
+                          </a:solidFill>
+                          <a:effectLst/>
+                          <a:latin typeface="Calibri"/>
+                        </a:rPr>
+                        <a:t> </a:t>
+                      </a:r>
+                    </a:p>
+                  </a:txBody>
+                  <a:tcPr marL="10137" marR="10137" marT="10137" marB="0">
+                    <a:lnL w="19050" cap="flat" cmpd="sng" algn="ctr">
+                      <a:solidFill>
+                        <a:srgbClr val="000000"/>
+                      </a:solidFill>
+                      <a:prstDash val="solid"/>
+                      <a:round/>
+                      <a:headEnd type="none" w="med" len="med"/>
+                      <a:tailEnd type="none" w="med" len="med"/>
+                    </a:lnL>
+                    <a:lnR w="19050" cap="flat" cmpd="sng" algn="ctr">
+                      <a:solidFill>
+                        <a:srgbClr val="000000"/>
+                      </a:solidFill>
+                      <a:prstDash val="solid"/>
+                      <a:round/>
+                      <a:headEnd type="none" w="med" len="med"/>
+                      <a:tailEnd type="none" w="med" len="med"/>
+                    </a:lnR>
+                    <a:lnT w="19050" cap="flat" cmpd="sng" algn="ctr">
+                      <a:solidFill>
+                        <a:srgbClr val="000000"/>
+                      </a:solidFill>
+                      <a:prstDash val="solid"/>
+                      <a:round/>
+                      <a:headEnd type="none" w="med" len="med"/>
+                      <a:tailEnd type="none" w="med" len="med"/>
+                    </a:lnT>
+                    <a:lnB w="19050" cap="flat" cmpd="sng" algn="ctr">
+                      <a:solidFill>
+                        <a:srgbClr val="000000"/>
+                      </a:solidFill>
+                      <a:prstDash val="solid"/>
+                      <a:round/>
+                      <a:headEnd type="none" w="med" len="med"/>
+                      <a:tailEnd type="none" w="med" len="med"/>
+                    </a:lnB>
+                    <a:solidFill>
+                      <a:srgbClr val="FFFF00"/>
+                    </a:solidFill>
+                  </a:tcPr>
+                </a:tc>
+                <a:tc>
+                  <a:txBody>
+                    <a:bodyPr/>
+                    <a:lstStyle/>
+                    <a:p>
+                      <a:pPr algn="l" fontAlgn="t"/>
+                      <a:r>
+                        <a:rPr lang="en-US" sz="900" b="0" i="0" u="none" strike="noStrike">
+                          <a:solidFill>
+                            <a:srgbClr val="000000"/>
+                          </a:solidFill>
+                          <a:effectLst/>
+                          <a:latin typeface="Calibri"/>
+                        </a:rPr>
+                        <a:t> </a:t>
+                      </a:r>
+                    </a:p>
+                  </a:txBody>
+                  <a:tcPr marL="10137" marR="10137" marT="10137" marB="0">
+                    <a:lnL w="19050" cap="flat" cmpd="sng" algn="ctr">
+                      <a:solidFill>
+                        <a:srgbClr val="000000"/>
+                      </a:solidFill>
+                      <a:prstDash val="solid"/>
+                      <a:round/>
+                      <a:headEnd type="none" w="med" len="med"/>
+                      <a:tailEnd type="none" w="med" len="med"/>
+                    </a:lnL>
+                    <a:lnR w="19050" cap="flat" cmpd="sng" algn="ctr">
+                      <a:solidFill>
+                        <a:srgbClr val="000000"/>
+                      </a:solidFill>
+                      <a:prstDash val="solid"/>
+                      <a:round/>
+                      <a:headEnd type="none" w="med" len="med"/>
+                      <a:tailEnd type="none" w="med" len="med"/>
+                    </a:lnR>
+                    <a:lnT w="19050" cap="flat" cmpd="sng" algn="ctr">
+                      <a:solidFill>
+                        <a:srgbClr val="000000"/>
+                      </a:solidFill>
+                      <a:prstDash val="solid"/>
+                      <a:round/>
+                      <a:headEnd type="none" w="med" len="med"/>
+                      <a:tailEnd type="none" w="med" len="med"/>
+                    </a:lnT>
+                    <a:lnB w="19050" cap="flat" cmpd="sng" algn="ctr">
+                      <a:solidFill>
+                        <a:srgbClr val="000000"/>
+                      </a:solidFill>
+                      <a:prstDash val="solid"/>
+                      <a:round/>
+                      <a:headEnd type="none" w="med" len="med"/>
+                      <a:tailEnd type="none" w="med" len="med"/>
+                    </a:lnB>
+                    <a:solidFill>
+                      <a:srgbClr val="FFFF00"/>
+                    </a:solidFill>
+                  </a:tcPr>
+                </a:tc>
+                <a:tc>
+                  <a:txBody>
+                    <a:bodyPr/>
+                    <a:lstStyle/>
+                    <a:p>
+                      <a:pPr algn="l" fontAlgn="t"/>
+                      <a:r>
+                        <a:rPr lang="en-US" sz="900" b="0" i="0" u="none" strike="noStrike">
+                          <a:solidFill>
+                            <a:srgbClr val="000000"/>
+                          </a:solidFill>
+                          <a:effectLst/>
+                          <a:latin typeface="Calibri"/>
+                        </a:rPr>
+                        <a:t>-Lack of direction from customer</a:t>
+                      </a:r>
+                    </a:p>
+                  </a:txBody>
+                  <a:tcPr marL="10137" marR="10137" marT="10137" marB="0">
+                    <a:lnL w="19050" cap="flat" cmpd="sng" algn="ctr">
+                      <a:solidFill>
+                        <a:srgbClr val="000000"/>
+                      </a:solidFill>
+                      <a:prstDash val="solid"/>
+                      <a:round/>
+                      <a:headEnd type="none" w="med" len="med"/>
+                      <a:tailEnd type="none" w="med" len="med"/>
+                    </a:lnL>
+                    <a:lnR w="19050" cap="flat" cmpd="sng" algn="ctr">
+                      <a:solidFill>
+                        <a:srgbClr val="000000"/>
+                      </a:solidFill>
+                      <a:prstDash val="solid"/>
+                      <a:round/>
+                      <a:headEnd type="none" w="med" len="med"/>
+                      <a:tailEnd type="none" w="med" len="med"/>
+                    </a:lnR>
+                    <a:lnT w="19050" cap="flat" cmpd="sng" algn="ctr">
+                      <a:solidFill>
+                        <a:srgbClr val="000000"/>
+                      </a:solidFill>
+                      <a:prstDash val="solid"/>
+                      <a:round/>
+                      <a:headEnd type="none" w="med" len="med"/>
+                      <a:tailEnd type="none" w="med" len="med"/>
+                    </a:lnT>
+                    <a:lnB w="19050" cap="flat" cmpd="sng" algn="ctr">
+                      <a:solidFill>
+                        <a:srgbClr val="000000"/>
+                      </a:solidFill>
+                      <a:prstDash val="solid"/>
+                      <a:round/>
+                      <a:headEnd type="none" w="med" len="med"/>
+                      <a:tailEnd type="none" w="med" len="med"/>
+                    </a:lnB>
+                    <a:solidFill>
+                      <a:srgbClr val="FFC000"/>
+                    </a:solidFill>
+                  </a:tcPr>
+                </a:tc>
+              </a:tr>
+              <a:tr h="721143">
+                <a:tc vMerge="1">
+                  <a:txBody>
+                    <a:bodyPr/>
+                    <a:lstStyle/>
+                    <a:p>
+                      <a:endParaRPr lang="en-US"/>
+                    </a:p>
+                  </a:txBody>
+                  <a:tcPr/>
+                </a:tc>
+                <a:tc>
+                  <a:txBody>
+                    <a:bodyPr/>
+                    <a:lstStyle/>
+                    <a:p>
+                      <a:pPr algn="ctr" fontAlgn="ctr"/>
+                      <a:r>
+                        <a:rPr lang="en-US" sz="900" b="0" i="0" u="none" strike="noStrike">
+                          <a:solidFill>
+                            <a:srgbClr val="000000"/>
+                          </a:solidFill>
+                          <a:effectLst/>
+                          <a:latin typeface="Calibri"/>
+                        </a:rPr>
+                        <a:t>Low-Medium</a:t>
+                      </a:r>
+                    </a:p>
+                  </a:txBody>
+                  <a:tcPr marL="10137" marR="10137" marT="10137" marB="0" anchor="ctr">
+                    <a:lnL w="19050" cap="flat" cmpd="sng" algn="ctr">
+                      <a:solidFill>
+                        <a:srgbClr val="000000"/>
+                      </a:solidFill>
+                      <a:prstDash val="solid"/>
+                      <a:round/>
+                      <a:headEnd type="none" w="med" len="med"/>
+                      <a:tailEnd type="none" w="med" len="med"/>
+                    </a:lnL>
+                    <a:lnR w="19050" cap="flat" cmpd="sng" algn="ctr">
+                      <a:solidFill>
+                        <a:srgbClr val="000000"/>
+                      </a:solidFill>
+                      <a:prstDash val="solid"/>
+                      <a:round/>
+                      <a:headEnd type="none" w="med" len="med"/>
+                      <a:tailEnd type="none" w="med" len="med"/>
+                    </a:lnR>
+                    <a:lnT w="19050" cap="flat" cmpd="sng" algn="ctr">
+                      <a:solidFill>
+                        <a:srgbClr val="000000"/>
+                      </a:solidFill>
+                      <a:prstDash val="solid"/>
+                      <a:round/>
+                      <a:headEnd type="none" w="med" len="med"/>
+                      <a:tailEnd type="none" w="med" len="med"/>
+                    </a:lnT>
+                    <a:lnB w="19050" cap="flat" cmpd="sng" algn="ctr">
+                      <a:solidFill>
+                        <a:srgbClr val="000000"/>
+                      </a:solidFill>
+                      <a:prstDash val="solid"/>
+                      <a:round/>
+                      <a:headEnd type="none" w="med" len="med"/>
+                      <a:tailEnd type="none" w="med" len="med"/>
+                    </a:lnB>
+                  </a:tcPr>
+                </a:tc>
+                <a:tc>
+                  <a:txBody>
+                    <a:bodyPr/>
+                    <a:lstStyle/>
+                    <a:p>
+                      <a:pPr algn="l" fontAlgn="t"/>
+                      <a:r>
+                        <a:rPr lang="en-US" sz="900" b="0" i="0" u="none" strike="noStrike">
+                          <a:solidFill>
+                            <a:srgbClr val="000000"/>
+                          </a:solidFill>
+                          <a:effectLst/>
+                          <a:latin typeface="Calibri"/>
+                        </a:rPr>
+                        <a:t> </a:t>
+                      </a:r>
+                    </a:p>
+                  </a:txBody>
+                  <a:tcPr marL="10137" marR="10137" marT="10137" marB="0">
+                    <a:lnL w="19050" cap="flat" cmpd="sng" algn="ctr">
+                      <a:solidFill>
+                        <a:srgbClr val="000000"/>
+                      </a:solidFill>
+                      <a:prstDash val="solid"/>
+                      <a:round/>
+                      <a:headEnd type="none" w="med" len="med"/>
+                      <a:tailEnd type="none" w="med" len="med"/>
+                    </a:lnL>
+                    <a:lnR w="19050" cap="flat" cmpd="sng" algn="ctr">
+                      <a:solidFill>
+                        <a:srgbClr val="000000"/>
+                      </a:solidFill>
+                      <a:prstDash val="solid"/>
+                      <a:round/>
+                      <a:headEnd type="none" w="med" len="med"/>
+                      <a:tailEnd type="none" w="med" len="med"/>
+                    </a:lnR>
+                    <a:lnT w="19050" cap="flat" cmpd="sng" algn="ctr">
+                      <a:solidFill>
+                        <a:srgbClr val="000000"/>
+                      </a:solidFill>
+                      <a:prstDash val="solid"/>
+                      <a:round/>
+                      <a:headEnd type="none" w="med" len="med"/>
+                      <a:tailEnd type="none" w="med" len="med"/>
+                    </a:lnT>
+                    <a:lnB w="19050" cap="flat" cmpd="sng" algn="ctr">
+                      <a:solidFill>
+                        <a:srgbClr val="000000"/>
+                      </a:solidFill>
+                      <a:prstDash val="solid"/>
+                      <a:round/>
+                      <a:headEnd type="none" w="med" len="med"/>
+                      <a:tailEnd type="none" w="med" len="med"/>
+                    </a:lnB>
+                    <a:solidFill>
+                      <a:srgbClr val="0070C0"/>
+                    </a:solidFill>
+                  </a:tcPr>
+                </a:tc>
+                <a:tc>
+                  <a:txBody>
+                    <a:bodyPr/>
+                    <a:lstStyle/>
+                    <a:p>
+                      <a:pPr algn="l" fontAlgn="t"/>
+                      <a:r>
+                        <a:rPr lang="en-US" sz="900" b="0" i="0" u="none" strike="noStrike">
+                          <a:solidFill>
+                            <a:srgbClr val="000000"/>
+                          </a:solidFill>
+                          <a:effectLst/>
+                          <a:latin typeface="Calibri"/>
+                        </a:rPr>
+                        <a:t> </a:t>
+                      </a:r>
+                    </a:p>
+                  </a:txBody>
+                  <a:tcPr marL="10137" marR="10137" marT="10137" marB="0">
+                    <a:lnL w="19050" cap="flat" cmpd="sng" algn="ctr">
+                      <a:solidFill>
+                        <a:srgbClr val="000000"/>
+                      </a:solidFill>
+                      <a:prstDash val="solid"/>
+                      <a:round/>
+                      <a:headEnd type="none" w="med" len="med"/>
+                      <a:tailEnd type="none" w="med" len="med"/>
+                    </a:lnL>
+                    <a:lnR w="19050" cap="flat" cmpd="sng" algn="ctr">
+                      <a:solidFill>
+                        <a:srgbClr val="000000"/>
+                      </a:solidFill>
+                      <a:prstDash val="solid"/>
+                      <a:round/>
+                      <a:headEnd type="none" w="med" len="med"/>
+                      <a:tailEnd type="none" w="med" len="med"/>
+                    </a:lnR>
+                    <a:lnT w="19050" cap="flat" cmpd="sng" algn="ctr">
+                      <a:solidFill>
+                        <a:srgbClr val="000000"/>
+                      </a:solidFill>
+                      <a:prstDash val="solid"/>
+                      <a:round/>
+                      <a:headEnd type="none" w="med" len="med"/>
+                      <a:tailEnd type="none" w="med" len="med"/>
+                    </a:lnT>
+                    <a:lnB w="19050" cap="flat" cmpd="sng" algn="ctr">
+                      <a:solidFill>
+                        <a:srgbClr val="000000"/>
+                      </a:solidFill>
+                      <a:prstDash val="solid"/>
+                      <a:round/>
+                      <a:headEnd type="none" w="med" len="med"/>
+                      <a:tailEnd type="none" w="med" len="med"/>
+                    </a:lnB>
+                    <a:solidFill>
+                      <a:srgbClr val="00B050"/>
+                    </a:solidFill>
+                  </a:tcPr>
+                </a:tc>
+                <a:tc>
+                  <a:txBody>
+                    <a:bodyPr/>
+                    <a:lstStyle/>
+                    <a:p>
+                      <a:pPr algn="l" fontAlgn="t"/>
+                      <a:r>
+                        <a:rPr lang="en-US" sz="900" b="0" i="0" u="none" strike="noStrike">
+                          <a:solidFill>
+                            <a:srgbClr val="000000"/>
+                          </a:solidFill>
+                          <a:effectLst/>
+                          <a:latin typeface="Calibri"/>
+                        </a:rPr>
+                        <a:t> </a:t>
+                      </a:r>
+                    </a:p>
+                  </a:txBody>
+                  <a:tcPr marL="10137" marR="10137" marT="10137" marB="0">
+                    <a:lnL w="19050" cap="flat" cmpd="sng" algn="ctr">
+                      <a:solidFill>
+                        <a:srgbClr val="000000"/>
+                      </a:solidFill>
+                      <a:prstDash val="solid"/>
+                      <a:round/>
+                      <a:headEnd type="none" w="med" len="med"/>
+                      <a:tailEnd type="none" w="med" len="med"/>
+                    </a:lnL>
+                    <a:lnR w="19050" cap="flat" cmpd="sng" algn="ctr">
+                      <a:solidFill>
+                        <a:srgbClr val="000000"/>
+                      </a:solidFill>
+                      <a:prstDash val="solid"/>
+                      <a:round/>
+                      <a:headEnd type="none" w="med" len="med"/>
+                      <a:tailEnd type="none" w="med" len="med"/>
+                    </a:lnR>
+                    <a:lnT w="19050" cap="flat" cmpd="sng" algn="ctr">
+                      <a:solidFill>
+                        <a:srgbClr val="000000"/>
+                      </a:solidFill>
+                      <a:prstDash val="solid"/>
+                      <a:round/>
+                      <a:headEnd type="none" w="med" len="med"/>
+                      <a:tailEnd type="none" w="med" len="med"/>
+                    </a:lnT>
+                    <a:lnB w="19050" cap="flat" cmpd="sng" algn="ctr">
+                      <a:solidFill>
+                        <a:srgbClr val="000000"/>
+                      </a:solidFill>
+                      <a:prstDash val="solid"/>
+                      <a:round/>
+                      <a:headEnd type="none" w="med" len="med"/>
+                      <a:tailEnd type="none" w="med" len="med"/>
+                    </a:lnB>
+                    <a:solidFill>
+                      <a:srgbClr val="FFFF00"/>
+                    </a:solidFill>
+                  </a:tcPr>
+                </a:tc>
+                <a:tc>
+                  <a:txBody>
+                    <a:bodyPr/>
+                    <a:lstStyle/>
+                    <a:p>
+                      <a:pPr algn="l" fontAlgn="t"/>
+                      <a:r>
+                        <a:rPr lang="en-US" sz="900" b="0" i="0" u="none" strike="noStrike">
+                          <a:solidFill>
+                            <a:srgbClr val="000000"/>
+                          </a:solidFill>
+                          <a:effectLst/>
+                          <a:latin typeface="Calibri"/>
+                        </a:rPr>
+                        <a:t> </a:t>
+                      </a:r>
+                    </a:p>
+                  </a:txBody>
+                  <a:tcPr marL="10137" marR="10137" marT="10137" marB="0">
+                    <a:lnL w="19050" cap="flat" cmpd="sng" algn="ctr">
+                      <a:solidFill>
+                        <a:srgbClr val="000000"/>
+                      </a:solidFill>
+                      <a:prstDash val="solid"/>
+                      <a:round/>
+                      <a:headEnd type="none" w="med" len="med"/>
+                      <a:tailEnd type="none" w="med" len="med"/>
+                    </a:lnL>
+                    <a:lnR w="19050" cap="flat" cmpd="sng" algn="ctr">
+                      <a:solidFill>
+                        <a:srgbClr val="000000"/>
+                      </a:solidFill>
+                      <a:prstDash val="solid"/>
+                      <a:round/>
+                      <a:headEnd type="none" w="med" len="med"/>
+                      <a:tailEnd type="none" w="med" len="med"/>
+                    </a:lnR>
+                    <a:lnT w="19050" cap="flat" cmpd="sng" algn="ctr">
+                      <a:solidFill>
+                        <a:srgbClr val="000000"/>
+                      </a:solidFill>
+                      <a:prstDash val="solid"/>
+                      <a:round/>
+                      <a:headEnd type="none" w="med" len="med"/>
+                      <a:tailEnd type="none" w="med" len="med"/>
+                    </a:lnT>
+                    <a:lnB w="19050" cap="flat" cmpd="sng" algn="ctr">
+                      <a:solidFill>
+                        <a:srgbClr val="000000"/>
+                      </a:solidFill>
+                      <a:prstDash val="solid"/>
+                      <a:round/>
+                      <a:headEnd type="none" w="med" len="med"/>
+                      <a:tailEnd type="none" w="med" len="med"/>
+                    </a:lnB>
+                    <a:solidFill>
+                      <a:srgbClr val="FFFF00"/>
+                    </a:solidFill>
+                  </a:tcPr>
+                </a:tc>
+                <a:tc>
+                  <a:txBody>
+                    <a:bodyPr/>
+                    <a:lstStyle/>
+                    <a:p>
+                      <a:pPr algn="l" fontAlgn="t"/>
+                      <a:r>
+                        <a:rPr lang="en-US" sz="900" b="0" i="0" u="none" strike="noStrike">
+                          <a:solidFill>
+                            <a:srgbClr val="000000"/>
+                          </a:solidFill>
+                          <a:effectLst/>
+                          <a:latin typeface="Calibri"/>
+                        </a:rPr>
+                        <a:t> </a:t>
+                      </a:r>
+                    </a:p>
+                  </a:txBody>
+                  <a:tcPr marL="10137" marR="10137" marT="10137" marB="0">
+                    <a:lnL w="19050" cap="flat" cmpd="sng" algn="ctr">
+                      <a:solidFill>
+                        <a:srgbClr val="000000"/>
+                      </a:solidFill>
+                      <a:prstDash val="solid"/>
+                      <a:round/>
+                      <a:headEnd type="none" w="med" len="med"/>
+                      <a:tailEnd type="none" w="med" len="med"/>
+                    </a:lnL>
+                    <a:lnR w="19050" cap="flat" cmpd="sng" algn="ctr">
+                      <a:solidFill>
+                        <a:srgbClr val="000000"/>
+                      </a:solidFill>
+                      <a:prstDash val="solid"/>
+                      <a:round/>
+                      <a:headEnd type="none" w="med" len="med"/>
+                      <a:tailEnd type="none" w="med" len="med"/>
+                    </a:lnR>
+                    <a:lnT w="19050" cap="flat" cmpd="sng" algn="ctr">
+                      <a:solidFill>
+                        <a:srgbClr val="000000"/>
+                      </a:solidFill>
+                      <a:prstDash val="solid"/>
+                      <a:round/>
+                      <a:headEnd type="none" w="med" len="med"/>
+                      <a:tailEnd type="none" w="med" len="med"/>
+                    </a:lnT>
+                    <a:lnB w="19050" cap="flat" cmpd="sng" algn="ctr">
+                      <a:solidFill>
+                        <a:srgbClr val="000000"/>
+                      </a:solidFill>
+                      <a:prstDash val="solid"/>
+                      <a:round/>
+                      <a:headEnd type="none" w="med" len="med"/>
+                      <a:tailEnd type="none" w="med" len="med"/>
+                    </a:lnB>
+                    <a:solidFill>
+                      <a:srgbClr val="FFFF00"/>
+                    </a:solidFill>
+                  </a:tcPr>
+                </a:tc>
+              </a:tr>
+              <a:tr h="480763">
+                <a:tc vMerge="1">
+                  <a:txBody>
+                    <a:bodyPr/>
+                    <a:lstStyle/>
+                    <a:p>
+                      <a:endParaRPr lang="en-US"/>
+                    </a:p>
+                  </a:txBody>
+                  <a:tcPr/>
+                </a:tc>
+                <a:tc>
+                  <a:txBody>
+                    <a:bodyPr/>
+                    <a:lstStyle/>
+                    <a:p>
+                      <a:pPr algn="ctr" fontAlgn="ctr"/>
+                      <a:r>
+                        <a:rPr lang="en-US" sz="900" b="0" i="0" u="none" strike="noStrike">
+                          <a:solidFill>
+                            <a:srgbClr val="000000"/>
+                          </a:solidFill>
+                          <a:effectLst/>
+                          <a:latin typeface="Calibri"/>
+                        </a:rPr>
+                        <a:t>Low</a:t>
+                      </a:r>
+                    </a:p>
+                  </a:txBody>
+                  <a:tcPr marL="10137" marR="10137" marT="10137" marB="0" anchor="ctr">
+                    <a:lnL w="19050" cap="flat" cmpd="sng" algn="ctr">
+                      <a:solidFill>
+                        <a:srgbClr val="000000"/>
+                      </a:solidFill>
+                      <a:prstDash val="solid"/>
+                      <a:round/>
+                      <a:headEnd type="none" w="med" len="med"/>
+                      <a:tailEnd type="none" w="med" len="med"/>
+                    </a:lnL>
+                    <a:lnR w="19050" cap="flat" cmpd="sng" algn="ctr">
+                      <a:solidFill>
+                        <a:srgbClr val="000000"/>
+                      </a:solidFill>
+                      <a:prstDash val="solid"/>
+                      <a:round/>
+                      <a:headEnd type="none" w="med" len="med"/>
+                      <a:tailEnd type="none" w="med" len="med"/>
+                    </a:lnR>
+                    <a:lnT w="19050" cap="flat" cmpd="sng" algn="ctr">
+                      <a:solidFill>
+                        <a:srgbClr val="000000"/>
+                      </a:solidFill>
+                      <a:prstDash val="solid"/>
+                      <a:round/>
+                      <a:headEnd type="none" w="med" len="med"/>
+                      <a:tailEnd type="none" w="med" len="med"/>
+                    </a:lnT>
+                    <a:lnB w="19050" cap="flat" cmpd="sng" algn="ctr">
+                      <a:solidFill>
+                        <a:srgbClr val="000000"/>
+                      </a:solidFill>
+                      <a:prstDash val="solid"/>
+                      <a:round/>
+                      <a:headEnd type="none" w="med" len="med"/>
+                      <a:tailEnd type="none" w="med" len="med"/>
+                    </a:lnB>
+                  </a:tcPr>
+                </a:tc>
+                <a:tc>
+                  <a:txBody>
+                    <a:bodyPr/>
+                    <a:lstStyle/>
+                    <a:p>
+                      <a:pPr algn="l" fontAlgn="t"/>
+                      <a:r>
+                        <a:rPr lang="en-US" sz="900" b="0" i="0" u="none" strike="noStrike">
+                          <a:solidFill>
+                            <a:srgbClr val="000000"/>
+                          </a:solidFill>
+                          <a:effectLst/>
+                          <a:latin typeface="Calibri"/>
+                        </a:rPr>
+                        <a:t>-Tool availability</a:t>
+                      </a:r>
+                    </a:p>
+                  </a:txBody>
+                  <a:tcPr marL="10137" marR="10137" marT="10137" marB="0">
+                    <a:lnL w="19050" cap="flat" cmpd="sng" algn="ctr">
+                      <a:solidFill>
+                        <a:srgbClr val="000000"/>
+                      </a:solidFill>
+                      <a:prstDash val="solid"/>
+                      <a:round/>
+                      <a:headEnd type="none" w="med" len="med"/>
+                      <a:tailEnd type="none" w="med" len="med"/>
+                    </a:lnL>
+                    <a:lnR w="19050" cap="flat" cmpd="sng" algn="ctr">
+                      <a:solidFill>
+                        <a:srgbClr val="000000"/>
+                      </a:solidFill>
+                      <a:prstDash val="solid"/>
+                      <a:round/>
+                      <a:headEnd type="none" w="med" len="med"/>
+                      <a:tailEnd type="none" w="med" len="med"/>
+                    </a:lnR>
+                    <a:lnT w="19050" cap="flat" cmpd="sng" algn="ctr">
+                      <a:solidFill>
+                        <a:srgbClr val="000000"/>
+                      </a:solidFill>
+                      <a:prstDash val="solid"/>
+                      <a:round/>
+                      <a:headEnd type="none" w="med" len="med"/>
+                      <a:tailEnd type="none" w="med" len="med"/>
+                    </a:lnT>
+                    <a:lnB w="19050" cap="flat" cmpd="sng" algn="ctr">
+                      <a:solidFill>
+                        <a:srgbClr val="000000"/>
+                      </a:solidFill>
+                      <a:prstDash val="solid"/>
+                      <a:round/>
+                      <a:headEnd type="none" w="med" len="med"/>
+                      <a:tailEnd type="none" w="med" len="med"/>
+                    </a:lnB>
+                    <a:solidFill>
+                      <a:srgbClr val="0070C0"/>
+                    </a:solidFill>
+                  </a:tcPr>
+                </a:tc>
+                <a:tc>
+                  <a:txBody>
+                    <a:bodyPr/>
+                    <a:lstStyle/>
+                    <a:p>
+                      <a:pPr algn="l" fontAlgn="t"/>
+                      <a:r>
+                        <a:rPr lang="en-US" sz="900" b="0" i="0" u="none" strike="noStrike">
+                          <a:solidFill>
+                            <a:srgbClr val="000000"/>
+                          </a:solidFill>
+                          <a:effectLst/>
+                          <a:latin typeface="Calibri"/>
+                        </a:rPr>
+                        <a:t> </a:t>
+                      </a:r>
+                    </a:p>
+                  </a:txBody>
+                  <a:tcPr marL="10137" marR="10137" marT="10137" marB="0">
+                    <a:lnL w="19050" cap="flat" cmpd="sng" algn="ctr">
+                      <a:solidFill>
+                        <a:srgbClr val="000000"/>
+                      </a:solidFill>
+                      <a:prstDash val="solid"/>
+                      <a:round/>
+                      <a:headEnd type="none" w="med" len="med"/>
+                      <a:tailEnd type="none" w="med" len="med"/>
+                    </a:lnL>
+                    <a:lnR w="19050" cap="flat" cmpd="sng" algn="ctr">
+                      <a:solidFill>
+                        <a:srgbClr val="000000"/>
+                      </a:solidFill>
+                      <a:prstDash val="solid"/>
+                      <a:round/>
+                      <a:headEnd type="none" w="med" len="med"/>
+                      <a:tailEnd type="none" w="med" len="med"/>
+                    </a:lnR>
+                    <a:lnT w="19050" cap="flat" cmpd="sng" algn="ctr">
+                      <a:solidFill>
+                        <a:srgbClr val="000000"/>
+                      </a:solidFill>
+                      <a:prstDash val="solid"/>
+                      <a:round/>
+                      <a:headEnd type="none" w="med" len="med"/>
+                      <a:tailEnd type="none" w="med" len="med"/>
+                    </a:lnT>
+                    <a:lnB w="19050" cap="flat" cmpd="sng" algn="ctr">
+                      <a:solidFill>
+                        <a:srgbClr val="000000"/>
+                      </a:solidFill>
+                      <a:prstDash val="solid"/>
+                      <a:round/>
+                      <a:headEnd type="none" w="med" len="med"/>
+                      <a:tailEnd type="none" w="med" len="med"/>
+                    </a:lnB>
+                    <a:solidFill>
+                      <a:srgbClr val="0070C0"/>
+                    </a:solidFill>
+                  </a:tcPr>
+                </a:tc>
+                <a:tc>
+                  <a:txBody>
+                    <a:bodyPr/>
+                    <a:lstStyle/>
+                    <a:p>
+                      <a:pPr algn="l" fontAlgn="t"/>
+                      <a:r>
+                        <a:rPr lang="en-US" sz="900" b="0" i="0" u="none" strike="noStrike">
+                          <a:solidFill>
+                            <a:srgbClr val="000000"/>
+                          </a:solidFill>
+                          <a:effectLst/>
+                          <a:latin typeface="Calibri"/>
+                        </a:rPr>
+                        <a:t> </a:t>
+                      </a:r>
+                    </a:p>
+                  </a:txBody>
+                  <a:tcPr marL="10137" marR="10137" marT="10137" marB="0">
+                    <a:lnL w="19050" cap="flat" cmpd="sng" algn="ctr">
+                      <a:solidFill>
+                        <a:srgbClr val="000000"/>
+                      </a:solidFill>
+                      <a:prstDash val="solid"/>
+                      <a:round/>
+                      <a:headEnd type="none" w="med" len="med"/>
+                      <a:tailEnd type="none" w="med" len="med"/>
+                    </a:lnL>
+                    <a:lnR w="19050" cap="flat" cmpd="sng" algn="ctr">
+                      <a:solidFill>
+                        <a:srgbClr val="000000"/>
+                      </a:solidFill>
+                      <a:prstDash val="solid"/>
+                      <a:round/>
+                      <a:headEnd type="none" w="med" len="med"/>
+                      <a:tailEnd type="none" w="med" len="med"/>
+                    </a:lnR>
+                    <a:lnT w="19050" cap="flat" cmpd="sng" algn="ctr">
+                      <a:solidFill>
+                        <a:srgbClr val="000000"/>
+                      </a:solidFill>
+                      <a:prstDash val="solid"/>
+                      <a:round/>
+                      <a:headEnd type="none" w="med" len="med"/>
+                      <a:tailEnd type="none" w="med" len="med"/>
+                    </a:lnT>
+                    <a:lnB w="19050" cap="flat" cmpd="sng" algn="ctr">
+                      <a:solidFill>
+                        <a:srgbClr val="000000"/>
+                      </a:solidFill>
+                      <a:prstDash val="solid"/>
+                      <a:round/>
+                      <a:headEnd type="none" w="med" len="med"/>
+                      <a:tailEnd type="none" w="med" len="med"/>
+                    </a:lnB>
+                    <a:solidFill>
+                      <a:srgbClr val="00B050"/>
+                    </a:solidFill>
+                  </a:tcPr>
+                </a:tc>
+                <a:tc>
+                  <a:txBody>
+                    <a:bodyPr/>
+                    <a:lstStyle/>
+                    <a:p>
+                      <a:pPr algn="l" fontAlgn="t"/>
+                      <a:r>
+                        <a:rPr lang="en-US" sz="900" b="0" i="0" u="none" strike="noStrike">
+                          <a:solidFill>
+                            <a:srgbClr val="000000"/>
+                          </a:solidFill>
+                          <a:effectLst/>
+                          <a:latin typeface="Calibri"/>
+                        </a:rPr>
+                        <a:t>-Project Member(s) Leaving</a:t>
+                      </a:r>
+                    </a:p>
+                  </a:txBody>
+                  <a:tcPr marL="10137" marR="10137" marT="10137" marB="0">
+                    <a:lnL w="19050" cap="flat" cmpd="sng" algn="ctr">
+                      <a:solidFill>
+                        <a:srgbClr val="000000"/>
+                      </a:solidFill>
+                      <a:prstDash val="solid"/>
+                      <a:round/>
+                      <a:headEnd type="none" w="med" len="med"/>
+                      <a:tailEnd type="none" w="med" len="med"/>
+                    </a:lnL>
+                    <a:lnR w="19050" cap="flat" cmpd="sng" algn="ctr">
+                      <a:solidFill>
+                        <a:srgbClr val="000000"/>
+                      </a:solidFill>
+                      <a:prstDash val="solid"/>
+                      <a:round/>
+                      <a:headEnd type="none" w="med" len="med"/>
+                      <a:tailEnd type="none" w="med" len="med"/>
+                    </a:lnR>
+                    <a:lnT w="19050" cap="flat" cmpd="sng" algn="ctr">
+                      <a:solidFill>
+                        <a:srgbClr val="000000"/>
+                      </a:solidFill>
+                      <a:prstDash val="solid"/>
+                      <a:round/>
+                      <a:headEnd type="none" w="med" len="med"/>
+                      <a:tailEnd type="none" w="med" len="med"/>
+                    </a:lnT>
+                    <a:lnB w="19050" cap="flat" cmpd="sng" algn="ctr">
+                      <a:solidFill>
+                        <a:srgbClr val="000000"/>
+                      </a:solidFill>
+                      <a:prstDash val="solid"/>
+                      <a:round/>
+                      <a:headEnd type="none" w="med" len="med"/>
+                      <a:tailEnd type="none" w="med" len="med"/>
+                    </a:lnB>
+                    <a:solidFill>
+                      <a:srgbClr val="FFFF00"/>
+                    </a:solidFill>
+                  </a:tcPr>
+                </a:tc>
+                <a:tc>
+                  <a:txBody>
+                    <a:bodyPr/>
+                    <a:lstStyle/>
+                    <a:p>
+                      <a:pPr algn="l" fontAlgn="t"/>
+                      <a:r>
+                        <a:rPr lang="en-US" sz="900" b="0" i="0" u="none" strike="noStrike">
+                          <a:solidFill>
+                            <a:srgbClr val="000000"/>
+                          </a:solidFill>
+                          <a:effectLst/>
+                          <a:latin typeface="Calibri"/>
+                        </a:rPr>
+                        <a:t> </a:t>
+                      </a:r>
+                    </a:p>
+                  </a:txBody>
+                  <a:tcPr marL="10137" marR="10137" marT="10137" marB="0">
+                    <a:lnL w="19050" cap="flat" cmpd="sng" algn="ctr">
+                      <a:solidFill>
+                        <a:srgbClr val="000000"/>
+                      </a:solidFill>
+                      <a:prstDash val="solid"/>
+                      <a:round/>
+                      <a:headEnd type="none" w="med" len="med"/>
+                      <a:tailEnd type="none" w="med" len="med"/>
+                    </a:lnL>
+                    <a:lnR w="19050" cap="flat" cmpd="sng" algn="ctr">
+                      <a:solidFill>
+                        <a:srgbClr val="000000"/>
+                      </a:solidFill>
+                      <a:prstDash val="solid"/>
+                      <a:round/>
+                      <a:headEnd type="none" w="med" len="med"/>
+                      <a:tailEnd type="none" w="med" len="med"/>
+                    </a:lnR>
+                    <a:lnT w="19050" cap="flat" cmpd="sng" algn="ctr">
+                      <a:solidFill>
+                        <a:srgbClr val="000000"/>
+                      </a:solidFill>
+                      <a:prstDash val="solid"/>
+                      <a:round/>
+                      <a:headEnd type="none" w="med" len="med"/>
+                      <a:tailEnd type="none" w="med" len="med"/>
+                    </a:lnT>
+                    <a:lnB w="19050" cap="flat" cmpd="sng" algn="ctr">
+                      <a:solidFill>
+                        <a:srgbClr val="000000"/>
+                      </a:solidFill>
+                      <a:prstDash val="solid"/>
+                      <a:round/>
+                      <a:headEnd type="none" w="med" len="med"/>
+                      <a:tailEnd type="none" w="med" len="med"/>
+                    </a:lnB>
+                    <a:solidFill>
+                      <a:srgbClr val="FFFF00"/>
+                    </a:solidFill>
+                  </a:tcPr>
+                </a:tc>
+              </a:tr>
+              <a:tr h="524468">
+                <a:tc>
+                  <a:txBody>
+                    <a:bodyPr/>
+                    <a:lstStyle/>
+                    <a:p>
+                      <a:pPr algn="l" fontAlgn="b"/>
+                      <a:r>
+                        <a:rPr lang="en-US" sz="900" b="0" i="0" u="none" strike="noStrike">
+                          <a:solidFill>
+                            <a:srgbClr val="000000"/>
+                          </a:solidFill>
+                          <a:effectLst/>
+                          <a:latin typeface="Calibri"/>
+                        </a:rPr>
+                        <a:t> </a:t>
+                      </a:r>
+                    </a:p>
+                  </a:txBody>
+                  <a:tcPr marL="10137" marR="10137" marT="10137" marB="0" anchor="b">
+                    <a:lnL w="19050" cap="flat" cmpd="sng" algn="ctr">
+                      <a:solidFill>
+                        <a:srgbClr val="000000"/>
+                      </a:solidFill>
+                      <a:prstDash val="solid"/>
+                      <a:round/>
+                      <a:headEnd type="none" w="med" len="med"/>
+                      <a:tailEnd type="none" w="med" len="med"/>
+                    </a:lnL>
+                    <a:lnR w="19050" cap="flat" cmpd="sng" algn="ctr">
+                      <a:solidFill>
+                        <a:srgbClr val="000000"/>
+                      </a:solidFill>
+                      <a:prstDash val="solid"/>
+                      <a:round/>
+                      <a:headEnd type="none" w="med" len="med"/>
+                      <a:tailEnd type="none" w="med" len="med"/>
+                    </a:lnR>
+                    <a:lnT w="19050" cap="flat" cmpd="sng" algn="ctr">
+                      <a:solidFill>
+                        <a:srgbClr val="000000"/>
+                      </a:solidFill>
+                      <a:prstDash val="solid"/>
+                      <a:round/>
+                      <a:headEnd type="none" w="med" len="med"/>
+                      <a:tailEnd type="none" w="med" len="med"/>
+                    </a:lnT>
+                    <a:lnB w="19050" cap="flat" cmpd="sng" algn="ctr">
+                      <a:solidFill>
+                        <a:srgbClr val="000000"/>
+                      </a:solidFill>
+                      <a:prstDash val="solid"/>
+                      <a:round/>
+                      <a:headEnd type="none" w="med" len="med"/>
+                      <a:tailEnd type="none" w="med" len="med"/>
+                    </a:lnB>
+                  </a:tcPr>
+                </a:tc>
+                <a:tc>
+                  <a:txBody>
+                    <a:bodyPr/>
+                    <a:lstStyle/>
+                    <a:p>
+                      <a:pPr algn="l" fontAlgn="b"/>
+                      <a:r>
+                        <a:rPr lang="en-US" sz="900" b="0" i="0" u="none" strike="noStrike">
+                          <a:solidFill>
+                            <a:srgbClr val="000000"/>
+                          </a:solidFill>
+                          <a:effectLst/>
+                          <a:latin typeface="Calibri"/>
+                        </a:rPr>
+                        <a:t> </a:t>
+                      </a:r>
+                    </a:p>
+                  </a:txBody>
+                  <a:tcPr marL="10137" marR="10137" marT="10137" marB="0" anchor="b">
+                    <a:lnL w="19050" cap="flat" cmpd="sng" algn="ctr">
+                      <a:solidFill>
+                        <a:srgbClr val="000000"/>
+                      </a:solidFill>
+                      <a:prstDash val="solid"/>
+                      <a:round/>
+                      <a:headEnd type="none" w="med" len="med"/>
+                      <a:tailEnd type="none" w="med" len="med"/>
+                    </a:lnL>
+                    <a:lnR w="19050" cap="flat" cmpd="sng" algn="ctr">
+                      <a:solidFill>
+                        <a:srgbClr val="000000"/>
+                      </a:solidFill>
+                      <a:prstDash val="solid"/>
+                      <a:round/>
+                      <a:headEnd type="none" w="med" len="med"/>
+                      <a:tailEnd type="none" w="med" len="med"/>
+                    </a:lnR>
+                    <a:lnT w="19050" cap="flat" cmpd="sng" algn="ctr">
+                      <a:solidFill>
+                        <a:srgbClr val="000000"/>
+                      </a:solidFill>
+                      <a:prstDash val="solid"/>
+                      <a:round/>
+                      <a:headEnd type="none" w="med" len="med"/>
+                      <a:tailEnd type="none" w="med" len="med"/>
+                    </a:lnT>
+                    <a:lnB w="19050" cap="flat" cmpd="sng" algn="ctr">
+                      <a:solidFill>
+                        <a:srgbClr val="000000"/>
+                      </a:solidFill>
+                      <a:prstDash val="solid"/>
+                      <a:round/>
+                      <a:headEnd type="none" w="med" len="med"/>
+                      <a:tailEnd type="none" w="med" len="med"/>
+                    </a:lnB>
+                  </a:tcPr>
+                </a:tc>
+                <a:tc>
+                  <a:txBody>
+                    <a:bodyPr/>
+                    <a:lstStyle/>
+                    <a:p>
+                      <a:pPr algn="ctr" fontAlgn="ctr"/>
+                      <a:r>
+                        <a:rPr lang="en-US" sz="900" b="0" i="0" u="none" strike="noStrike">
+                          <a:solidFill>
+                            <a:srgbClr val="000000"/>
+                          </a:solidFill>
+                          <a:effectLst/>
+                          <a:latin typeface="Calibri"/>
+                        </a:rPr>
+                        <a:t>Low</a:t>
+                      </a:r>
+                    </a:p>
+                  </a:txBody>
+                  <a:tcPr marL="10137" marR="10137" marT="10137" marB="0" anchor="ctr">
+                    <a:lnL w="19050" cap="flat" cmpd="sng" algn="ctr">
+                      <a:solidFill>
+                        <a:srgbClr val="000000"/>
+                      </a:solidFill>
+                      <a:prstDash val="solid"/>
+                      <a:round/>
+                      <a:headEnd type="none" w="med" len="med"/>
+                      <a:tailEnd type="none" w="med" len="med"/>
+                    </a:lnL>
+                    <a:lnR w="19050" cap="flat" cmpd="sng" algn="ctr">
+                      <a:solidFill>
+                        <a:srgbClr val="000000"/>
+                      </a:solidFill>
+                      <a:prstDash val="solid"/>
+                      <a:round/>
+                      <a:headEnd type="none" w="med" len="med"/>
+                      <a:tailEnd type="none" w="med" len="med"/>
+                    </a:lnR>
+                    <a:lnT w="19050" cap="flat" cmpd="sng" algn="ctr">
+                      <a:solidFill>
+                        <a:srgbClr val="000000"/>
+                      </a:solidFill>
+                      <a:prstDash val="solid"/>
+                      <a:round/>
+                      <a:headEnd type="none" w="med" len="med"/>
+                      <a:tailEnd type="none" w="med" len="med"/>
+                    </a:lnT>
+                    <a:lnB w="19050" cap="flat" cmpd="sng" algn="ctr">
+                      <a:solidFill>
+                        <a:srgbClr val="000000"/>
+                      </a:solidFill>
+                      <a:prstDash val="solid"/>
+                      <a:round/>
+                      <a:headEnd type="none" w="med" len="med"/>
+                      <a:tailEnd type="none" w="med" len="med"/>
+                    </a:lnB>
+                  </a:tcPr>
+                </a:tc>
+                <a:tc>
+                  <a:txBody>
+                    <a:bodyPr/>
+                    <a:lstStyle/>
+                    <a:p>
+                      <a:pPr algn="ctr" fontAlgn="ctr"/>
+                      <a:r>
+                        <a:rPr lang="en-US" sz="900" b="0" i="0" u="none" strike="noStrike">
+                          <a:solidFill>
+                            <a:srgbClr val="000000"/>
+                          </a:solidFill>
+                          <a:effectLst/>
+                          <a:latin typeface="Calibri"/>
+                        </a:rPr>
+                        <a:t>Low-Medium</a:t>
+                      </a:r>
+                    </a:p>
+                  </a:txBody>
+                  <a:tcPr marL="10137" marR="10137" marT="10137" marB="0" anchor="ctr">
+                    <a:lnL w="19050" cap="flat" cmpd="sng" algn="ctr">
+                      <a:solidFill>
+                        <a:srgbClr val="000000"/>
+                      </a:solidFill>
+                      <a:prstDash val="solid"/>
+                      <a:round/>
+                      <a:headEnd type="none" w="med" len="med"/>
+                      <a:tailEnd type="none" w="med" len="med"/>
+                    </a:lnL>
+                    <a:lnR w="19050" cap="flat" cmpd="sng" algn="ctr">
+                      <a:solidFill>
+                        <a:srgbClr val="000000"/>
+                      </a:solidFill>
+                      <a:prstDash val="solid"/>
+                      <a:round/>
+                      <a:headEnd type="none" w="med" len="med"/>
+                      <a:tailEnd type="none" w="med" len="med"/>
+                    </a:lnR>
+                    <a:lnT w="19050" cap="flat" cmpd="sng" algn="ctr">
+                      <a:solidFill>
+                        <a:srgbClr val="000000"/>
+                      </a:solidFill>
+                      <a:prstDash val="solid"/>
+                      <a:round/>
+                      <a:headEnd type="none" w="med" len="med"/>
+                      <a:tailEnd type="none" w="med" len="med"/>
+                    </a:lnT>
+                    <a:lnB w="19050" cap="flat" cmpd="sng" algn="ctr">
+                      <a:solidFill>
+                        <a:srgbClr val="000000"/>
+                      </a:solidFill>
+                      <a:prstDash val="solid"/>
+                      <a:round/>
+                      <a:headEnd type="none" w="med" len="med"/>
+                      <a:tailEnd type="none" w="med" len="med"/>
+                    </a:lnB>
+                  </a:tcPr>
+                </a:tc>
+                <a:tc>
+                  <a:txBody>
+                    <a:bodyPr/>
+                    <a:lstStyle/>
+                    <a:p>
+                      <a:pPr algn="ctr" fontAlgn="ctr"/>
+                      <a:r>
+                        <a:rPr lang="en-US" sz="900" b="0" i="0" u="none" strike="noStrike">
+                          <a:solidFill>
+                            <a:srgbClr val="000000"/>
+                          </a:solidFill>
+                          <a:effectLst/>
+                          <a:latin typeface="Calibri"/>
+                        </a:rPr>
+                        <a:t>Medium</a:t>
+                      </a:r>
+                    </a:p>
+                  </a:txBody>
+                  <a:tcPr marL="10137" marR="10137" marT="10137" marB="0" anchor="ctr">
+                    <a:lnL w="19050" cap="flat" cmpd="sng" algn="ctr">
+                      <a:solidFill>
+                        <a:srgbClr val="000000"/>
+                      </a:solidFill>
+                      <a:prstDash val="solid"/>
+                      <a:round/>
+                      <a:headEnd type="none" w="med" len="med"/>
+                      <a:tailEnd type="none" w="med" len="med"/>
+                    </a:lnL>
+                    <a:lnR w="19050" cap="flat" cmpd="sng" algn="ctr">
+                      <a:solidFill>
+                        <a:srgbClr val="000000"/>
+                      </a:solidFill>
+                      <a:prstDash val="solid"/>
+                      <a:round/>
+                      <a:headEnd type="none" w="med" len="med"/>
+                      <a:tailEnd type="none" w="med" len="med"/>
+                    </a:lnR>
+                    <a:lnT w="19050" cap="flat" cmpd="sng" algn="ctr">
+                      <a:solidFill>
+                        <a:srgbClr val="000000"/>
+                      </a:solidFill>
+                      <a:prstDash val="solid"/>
+                      <a:round/>
+                      <a:headEnd type="none" w="med" len="med"/>
+                      <a:tailEnd type="none" w="med" len="med"/>
+                    </a:lnT>
+                    <a:lnB w="19050" cap="flat" cmpd="sng" algn="ctr">
+                      <a:solidFill>
+                        <a:srgbClr val="000000"/>
+                      </a:solidFill>
+                      <a:prstDash val="solid"/>
+                      <a:round/>
+                      <a:headEnd type="none" w="med" len="med"/>
+                      <a:tailEnd type="none" w="med" len="med"/>
+                    </a:lnB>
+                  </a:tcPr>
+                </a:tc>
+                <a:tc>
+                  <a:txBody>
+                    <a:bodyPr/>
+                    <a:lstStyle/>
+                    <a:p>
+                      <a:pPr algn="ctr" fontAlgn="ctr"/>
+                      <a:r>
+                        <a:rPr lang="en-US" sz="900" b="0" i="0" u="none" strike="noStrike">
+                          <a:solidFill>
+                            <a:srgbClr val="000000"/>
+                          </a:solidFill>
+                          <a:effectLst/>
+                          <a:latin typeface="Calibri"/>
+                        </a:rPr>
+                        <a:t>Medium-High</a:t>
+                      </a:r>
+                    </a:p>
+                  </a:txBody>
+                  <a:tcPr marL="10137" marR="10137" marT="10137" marB="0" anchor="ctr">
+                    <a:lnL w="19050" cap="flat" cmpd="sng" algn="ctr">
+                      <a:solidFill>
+                        <a:srgbClr val="000000"/>
+                      </a:solidFill>
+                      <a:prstDash val="solid"/>
+                      <a:round/>
+                      <a:headEnd type="none" w="med" len="med"/>
+                      <a:tailEnd type="none" w="med" len="med"/>
+                    </a:lnL>
+                    <a:lnR w="19050" cap="flat" cmpd="sng" algn="ctr">
+                      <a:solidFill>
+                        <a:srgbClr val="000000"/>
+                      </a:solidFill>
+                      <a:prstDash val="solid"/>
+                      <a:round/>
+                      <a:headEnd type="none" w="med" len="med"/>
+                      <a:tailEnd type="none" w="med" len="med"/>
+                    </a:lnR>
+                    <a:lnT w="19050" cap="flat" cmpd="sng" algn="ctr">
+                      <a:solidFill>
+                        <a:srgbClr val="000000"/>
+                      </a:solidFill>
+                      <a:prstDash val="solid"/>
+                      <a:round/>
+                      <a:headEnd type="none" w="med" len="med"/>
+                      <a:tailEnd type="none" w="med" len="med"/>
+                    </a:lnT>
+                    <a:lnB w="19050" cap="flat" cmpd="sng" algn="ctr">
+                      <a:solidFill>
+                        <a:srgbClr val="000000"/>
+                      </a:solidFill>
+                      <a:prstDash val="solid"/>
+                      <a:round/>
+                      <a:headEnd type="none" w="med" len="med"/>
+                      <a:tailEnd type="none" w="med" len="med"/>
+                    </a:lnB>
+                  </a:tcPr>
+                </a:tc>
+                <a:tc>
+                  <a:txBody>
+                    <a:bodyPr/>
+                    <a:lstStyle/>
+                    <a:p>
+                      <a:pPr algn="ctr" fontAlgn="ctr"/>
+                      <a:r>
+                        <a:rPr lang="en-US" sz="900" b="0" i="0" u="none" strike="noStrike">
+                          <a:solidFill>
+                            <a:srgbClr val="000000"/>
+                          </a:solidFill>
+                          <a:effectLst/>
+                          <a:latin typeface="Calibri"/>
+                        </a:rPr>
+                        <a:t>High</a:t>
+                      </a:r>
+                    </a:p>
+                  </a:txBody>
+                  <a:tcPr marL="10137" marR="10137" marT="10137" marB="0" anchor="ctr">
+                    <a:lnL w="19050" cap="flat" cmpd="sng" algn="ctr">
+                      <a:solidFill>
+                        <a:srgbClr val="000000"/>
+                      </a:solidFill>
+                      <a:prstDash val="solid"/>
+                      <a:round/>
+                      <a:headEnd type="none" w="med" len="med"/>
+                      <a:tailEnd type="none" w="med" len="med"/>
+                    </a:lnL>
+                    <a:lnR w="19050" cap="flat" cmpd="sng" algn="ctr">
+                      <a:solidFill>
+                        <a:srgbClr val="000000"/>
+                      </a:solidFill>
+                      <a:prstDash val="solid"/>
+                      <a:round/>
+                      <a:headEnd type="none" w="med" len="med"/>
+                      <a:tailEnd type="none" w="med" len="med"/>
+                    </a:lnR>
+                    <a:lnT w="19050" cap="flat" cmpd="sng" algn="ctr">
+                      <a:solidFill>
+                        <a:srgbClr val="000000"/>
+                      </a:solidFill>
+                      <a:prstDash val="solid"/>
+                      <a:round/>
+                      <a:headEnd type="none" w="med" len="med"/>
+                      <a:tailEnd type="none" w="med" len="med"/>
+                    </a:lnT>
+                    <a:lnB w="19050" cap="flat" cmpd="sng" algn="ctr">
+                      <a:solidFill>
+                        <a:srgbClr val="000000"/>
+                      </a:solidFill>
+                      <a:prstDash val="solid"/>
+                      <a:round/>
+                      <a:headEnd type="none" w="med" len="med"/>
+                      <a:tailEnd type="none" w="med" len="med"/>
+                    </a:lnB>
+                  </a:tcPr>
+                </a:tc>
+              </a:tr>
+              <a:tr h="524468">
+                <a:tc>
+                  <a:txBody>
+                    <a:bodyPr/>
+                    <a:lstStyle/>
+                    <a:p>
+                      <a:pPr algn="l" fontAlgn="b"/>
+                      <a:r>
+                        <a:rPr lang="en-US" sz="900" b="0" i="0" u="none" strike="noStrike">
+                          <a:solidFill>
+                            <a:srgbClr val="000000"/>
+                          </a:solidFill>
+                          <a:effectLst/>
+                          <a:latin typeface="Calibri"/>
+                        </a:rPr>
+                        <a:t> </a:t>
+                      </a:r>
+                    </a:p>
+                  </a:txBody>
+                  <a:tcPr marL="10137" marR="10137" marT="10137" marB="0" anchor="b">
+                    <a:lnL w="19050" cap="flat" cmpd="sng" algn="ctr">
+                      <a:solidFill>
+                        <a:srgbClr val="000000"/>
+                      </a:solidFill>
+                      <a:prstDash val="solid"/>
+                      <a:round/>
+                      <a:headEnd type="none" w="med" len="med"/>
+                      <a:tailEnd type="none" w="med" len="med"/>
+                    </a:lnL>
+                    <a:lnR w="19050" cap="flat" cmpd="sng" algn="ctr">
+                      <a:solidFill>
+                        <a:srgbClr val="000000"/>
+                      </a:solidFill>
+                      <a:prstDash val="solid"/>
+                      <a:round/>
+                      <a:headEnd type="none" w="med" len="med"/>
+                      <a:tailEnd type="none" w="med" len="med"/>
+                    </a:lnR>
+                    <a:lnT w="19050" cap="flat" cmpd="sng" algn="ctr">
+                      <a:solidFill>
+                        <a:srgbClr val="000000"/>
+                      </a:solidFill>
+                      <a:prstDash val="solid"/>
+                      <a:round/>
+                      <a:headEnd type="none" w="med" len="med"/>
+                      <a:tailEnd type="none" w="med" len="med"/>
+                    </a:lnT>
+                    <a:lnB w="19050" cap="flat" cmpd="sng" algn="ctr">
+                      <a:solidFill>
+                        <a:srgbClr val="000000"/>
+                      </a:solidFill>
+                      <a:prstDash val="solid"/>
+                      <a:round/>
+                      <a:headEnd type="none" w="med" len="med"/>
+                      <a:tailEnd type="none" w="med" len="med"/>
+                    </a:lnB>
+                  </a:tcPr>
+                </a:tc>
+                <a:tc>
+                  <a:txBody>
+                    <a:bodyPr/>
+                    <a:lstStyle/>
+                    <a:p>
+                      <a:pPr algn="l" fontAlgn="b"/>
+                      <a:r>
+                        <a:rPr lang="en-US" sz="900" b="0" i="0" u="none" strike="noStrike">
+                          <a:solidFill>
+                            <a:srgbClr val="000000"/>
+                          </a:solidFill>
+                          <a:effectLst/>
+                          <a:latin typeface="Calibri"/>
+                        </a:rPr>
+                        <a:t> </a:t>
+                      </a:r>
+                    </a:p>
+                  </a:txBody>
+                  <a:tcPr marL="10137" marR="10137" marT="10137" marB="0" anchor="b">
+                    <a:lnL w="19050" cap="flat" cmpd="sng" algn="ctr">
+                      <a:solidFill>
+                        <a:srgbClr val="000000"/>
+                      </a:solidFill>
+                      <a:prstDash val="solid"/>
+                      <a:round/>
+                      <a:headEnd type="none" w="med" len="med"/>
+                      <a:tailEnd type="none" w="med" len="med"/>
+                    </a:lnL>
+                    <a:lnR w="19050" cap="flat" cmpd="sng" algn="ctr">
+                      <a:solidFill>
+                        <a:srgbClr val="000000"/>
+                      </a:solidFill>
+                      <a:prstDash val="solid"/>
+                      <a:round/>
+                      <a:headEnd type="none" w="med" len="med"/>
+                      <a:tailEnd type="none" w="med" len="med"/>
+                    </a:lnR>
+                    <a:lnT w="19050" cap="flat" cmpd="sng" algn="ctr">
+                      <a:solidFill>
+                        <a:srgbClr val="000000"/>
+                      </a:solidFill>
+                      <a:prstDash val="solid"/>
+                      <a:round/>
+                      <a:headEnd type="none" w="med" len="med"/>
+                      <a:tailEnd type="none" w="med" len="med"/>
+                    </a:lnT>
+                    <a:lnB w="19050" cap="flat" cmpd="sng" algn="ctr">
+                      <a:solidFill>
+                        <a:srgbClr val="000000"/>
+                      </a:solidFill>
+                      <a:prstDash val="solid"/>
+                      <a:round/>
+                      <a:headEnd type="none" w="med" len="med"/>
+                      <a:tailEnd type="none" w="med" len="med"/>
+                    </a:lnB>
+                  </a:tcPr>
+                </a:tc>
+                <a:tc gridSpan="5">
+                  <a:txBody>
+                    <a:bodyPr/>
+                    <a:lstStyle/>
+                    <a:p>
+                      <a:pPr algn="ctr" fontAlgn="ctr"/>
+                      <a:r>
+                        <a:rPr lang="en-US" sz="900" b="0" i="0" u="none" strike="noStrike" dirty="0">
+                          <a:solidFill>
+                            <a:srgbClr val="000000"/>
+                          </a:solidFill>
+                          <a:effectLst/>
+                          <a:latin typeface="Calibri"/>
+                        </a:rPr>
+                        <a:t>Consequence of Risk Impact</a:t>
+                      </a:r>
+                    </a:p>
+                  </a:txBody>
+                  <a:tcPr marL="10137" marR="10137" marT="10137" marB="0" anchor="ctr">
+                    <a:lnL w="19050" cap="flat" cmpd="sng" algn="ctr">
+                      <a:solidFill>
+                        <a:srgbClr val="000000"/>
+                      </a:solidFill>
+                      <a:prstDash val="solid"/>
+                      <a:round/>
+                      <a:headEnd type="none" w="med" len="med"/>
+                      <a:tailEnd type="none" w="med" len="med"/>
+                    </a:lnL>
+                    <a:lnR w="19050" cap="flat" cmpd="sng" algn="ctr">
+                      <a:solidFill>
+                        <a:srgbClr val="000000"/>
+                      </a:solidFill>
+                      <a:prstDash val="solid"/>
+                      <a:round/>
+                      <a:headEnd type="none" w="med" len="med"/>
+                      <a:tailEnd type="none" w="med" len="med"/>
+                    </a:lnR>
+                    <a:lnT w="19050" cap="flat" cmpd="sng" algn="ctr">
+                      <a:solidFill>
+                        <a:srgbClr val="000000"/>
+                      </a:solidFill>
+                      <a:prstDash val="solid"/>
+                      <a:round/>
+                      <a:headEnd type="none" w="med" len="med"/>
+                      <a:tailEnd type="none" w="med" len="med"/>
+                    </a:lnT>
+                    <a:lnB w="19050" cap="flat" cmpd="sng" algn="ctr">
+                      <a:solidFill>
+                        <a:srgbClr val="000000"/>
+                      </a:solidFill>
+                      <a:prstDash val="solid"/>
+                      <a:round/>
+                      <a:headEnd type="none" w="med" len="med"/>
+                      <a:tailEnd type="none" w="med" len="med"/>
+                    </a:lnB>
+                  </a:tcPr>
+                </a:tc>
+                <a:tc hMerge="1">
+                  <a:txBody>
+                    <a:bodyPr/>
+                    <a:lstStyle/>
+                    <a:p>
+                      <a:endParaRPr lang="en-US"/>
+                    </a:p>
+                  </a:txBody>
+                  <a:tcPr/>
+                </a:tc>
+                <a:tc hMerge="1">
+                  <a:txBody>
+                    <a:bodyPr/>
+                    <a:lstStyle/>
+                    <a:p>
+                      <a:endParaRPr lang="en-US"/>
+                    </a:p>
+                  </a:txBody>
+                  <a:tcPr/>
+                </a:tc>
+                <a:tc hMerge="1">
+                  <a:txBody>
+                    <a:bodyPr/>
+                    <a:lstStyle/>
+                    <a:p>
+                      <a:endParaRPr lang="en-US"/>
+                    </a:p>
+                  </a:txBody>
+                  <a:tcPr/>
+                </a:tc>
+                <a:tc hMerge="1">
+                  <a:txBody>
+                    <a:bodyPr/>
+                    <a:lstStyle/>
+                    <a:p>
+                      <a:endParaRPr lang="en-US"/>
+                    </a:p>
+                  </a:txBody>
+                  <a:tcPr/>
+                </a:tc>
+              </a:tr>
+            </a:tbl>
+          </a:graphicData>
+        </a:graphic>
+      </p:graphicFrame>
     </p:spTree>
     <p:extLst>
       <p:ext uri="{BB962C8B-B14F-4D97-AF65-F5344CB8AC3E}">
-        <p14:creationId xmlns:p14="http://schemas.microsoft.com/office/powerpoint/2010/main" val="1267928927"/>
+        <p14:creationId xmlns:p14="http://schemas.microsoft.com/office/powerpoint/2010/main" val="4046258953"/>
       </p:ext>
     </p:extLst>
   </p:cSld>
   <p:clrMapOvr>
     <a:masterClrMapping/>
   </p:clrMapOvr>
+  <p:timing>
+    <p:tnLst>
+      <p:par>
+        <p:cTn xmlns:p14="http://schemas.microsoft.com/office/powerpoint/2010/main" id="1" dur="indefinite" restart="never" nodeType="tmRoot"/>
+      </p:par>
+    </p:tnLst>
+  </p:timing>
 </p:sld>
 </file>
 
@@ -4715,46 +7303,58 @@
         </p:nvSpPr>
         <p:spPr/>
         <p:txBody>
+          <a:bodyPr>
+            <a:normAutofit/>
+          </a:bodyPr>
+          <a:lstStyle/>
+          <a:p>
+            <a:r>
+              <a:rPr lang="en-US" dirty="0" smtClean="0"/>
+              <a:t>Requirements Overall</a:t>
+            </a:r>
+            <a:endParaRPr lang="en-US" dirty="0"/>
+          </a:p>
+        </p:txBody>
+      </p:sp>
+      <p:sp>
+        <p:nvSpPr>
+          <p:cNvPr id="3" name="Content Placeholder 2"/>
+          <p:cNvSpPr>
+            <a:spLocks noGrp="1"/>
+          </p:cNvSpPr>
+          <p:nvPr>
+            <p:ph idx="1"/>
+          </p:nvPr>
+        </p:nvSpPr>
+        <p:spPr/>
+        <p:txBody>
           <a:bodyPr/>
           <a:lstStyle/>
           <a:p>
-            <a:r>
-              <a:rPr lang="en-US" dirty="0" smtClean="0"/>
-              <a:t>Requirements 2</a:t>
-            </a:r>
+            <a:pPr marL="36576" indent="0">
+              <a:buNone/>
+            </a:pPr>
             <a:endParaRPr lang="en-US" dirty="0"/>
-          </a:p>
-        </p:txBody>
-      </p:sp>
-      <p:sp>
-        <p:nvSpPr>
-          <p:cNvPr id="3" name="Content Placeholder 2"/>
-          <p:cNvSpPr>
-            <a:spLocks noGrp="1"/>
-          </p:cNvSpPr>
-          <p:nvPr>
-            <p:ph idx="1"/>
-          </p:nvPr>
-        </p:nvSpPr>
-        <p:spPr/>
-        <p:txBody>
-          <a:bodyPr/>
-          <a:lstStyle/>
-          <a:p>
-            <a:endParaRPr lang="en-US"/>
           </a:p>
         </p:txBody>
       </p:sp>
     </p:spTree>
     <p:extLst>
       <p:ext uri="{BB962C8B-B14F-4D97-AF65-F5344CB8AC3E}">
-        <p14:creationId xmlns:p14="http://schemas.microsoft.com/office/powerpoint/2010/main" val="1315807786"/>
+        <p14:creationId xmlns:p14="http://schemas.microsoft.com/office/powerpoint/2010/main" val="1267928927"/>
       </p:ext>
     </p:extLst>
   </p:cSld>
   <p:clrMapOvr>
     <a:masterClrMapping/>
   </p:clrMapOvr>
+  <p:timing>
+    <p:tnLst>
+      <p:par>
+        <p:cTn xmlns:p14="http://schemas.microsoft.com/office/powerpoint/2010/main" id="1" dur="indefinite" restart="never" nodeType="tmRoot"/>
+      </p:par>
+    </p:tnLst>
+  </p:timing>
 </p:sld>
 </file>
 
@@ -4787,46 +7387,58 @@
         </p:nvSpPr>
         <p:spPr/>
         <p:txBody>
+          <a:bodyPr>
+            <a:normAutofit fontScale="90000"/>
+          </a:bodyPr>
+          <a:lstStyle/>
+          <a:p>
+            <a:r>
+              <a:rPr lang="en-US" dirty="0" smtClean="0"/>
+              <a:t>Requirements Current Iteration</a:t>
+            </a:r>
+            <a:endParaRPr lang="en-US" dirty="0"/>
+          </a:p>
+        </p:txBody>
+      </p:sp>
+      <p:sp>
+        <p:nvSpPr>
+          <p:cNvPr id="3" name="Content Placeholder 2"/>
+          <p:cNvSpPr>
+            <a:spLocks noGrp="1"/>
+          </p:cNvSpPr>
+          <p:nvPr>
+            <p:ph idx="1"/>
+          </p:nvPr>
+        </p:nvSpPr>
+        <p:spPr/>
+        <p:txBody>
           <a:bodyPr/>
           <a:lstStyle/>
           <a:p>
-            <a:r>
-              <a:rPr lang="en-US" dirty="0" smtClean="0"/>
-              <a:t>Requirements 3</a:t>
-            </a:r>
+            <a:pPr marL="36576" indent="0">
+              <a:buNone/>
+            </a:pPr>
             <a:endParaRPr lang="en-US" dirty="0"/>
-          </a:p>
-        </p:txBody>
-      </p:sp>
-      <p:sp>
-        <p:nvSpPr>
-          <p:cNvPr id="3" name="Content Placeholder 2"/>
-          <p:cNvSpPr>
-            <a:spLocks noGrp="1"/>
-          </p:cNvSpPr>
-          <p:nvPr>
-            <p:ph idx="1"/>
-          </p:nvPr>
-        </p:nvSpPr>
-        <p:spPr/>
-        <p:txBody>
-          <a:bodyPr/>
-          <a:lstStyle/>
-          <a:p>
-            <a:endParaRPr lang="en-US"/>
           </a:p>
         </p:txBody>
       </p:sp>
     </p:spTree>
     <p:extLst>
       <p:ext uri="{BB962C8B-B14F-4D97-AF65-F5344CB8AC3E}">
-        <p14:creationId xmlns:p14="http://schemas.microsoft.com/office/powerpoint/2010/main" val="1377163205"/>
+        <p14:creationId xmlns:p14="http://schemas.microsoft.com/office/powerpoint/2010/main" val="1315807786"/>
       </p:ext>
     </p:extLst>
   </p:cSld>
   <p:clrMapOvr>
     <a:masterClrMapping/>
   </p:clrMapOvr>
+  <p:timing>
+    <p:tnLst>
+      <p:par>
+        <p:cTn xmlns:p14="http://schemas.microsoft.com/office/powerpoint/2010/main" id="1" dur="indefinite" restart="never" nodeType="tmRoot"/>
+      </p:par>
+    </p:tnLst>
+  </p:timing>
 </p:sld>
 </file>
 
@@ -4857,48 +7469,90 @@
             <p:ph type="title"/>
           </p:nvPr>
         </p:nvSpPr>
+        <p:spPr>
+          <a:xfrm>
+            <a:off x="457200" y="274638"/>
+            <a:ext cx="7467600" cy="512762"/>
+          </a:xfrm>
+        </p:spPr>
+        <p:txBody>
+          <a:bodyPr>
+            <a:normAutofit fontScale="90000"/>
+          </a:bodyPr>
+          <a:lstStyle/>
+          <a:p>
+            <a:pPr algn="ctr"/>
+            <a:r>
+              <a:rPr lang="en-US" dirty="0" smtClean="0"/>
+              <a:t>Use Case Diagram</a:t>
+            </a:r>
+            <a:endParaRPr lang="en-US" dirty="0"/>
+          </a:p>
+        </p:txBody>
+      </p:sp>
+      <p:sp>
+        <p:nvSpPr>
+          <p:cNvPr id="3" name="Content Placeholder 2"/>
+          <p:cNvSpPr>
+            <a:spLocks noGrp="1"/>
+          </p:cNvSpPr>
+          <p:nvPr>
+            <p:ph idx="1"/>
+          </p:nvPr>
+        </p:nvSpPr>
         <p:spPr/>
         <p:txBody>
           <a:bodyPr/>
           <a:lstStyle/>
           <a:p>
-            <a:r>
-              <a:rPr lang="en-US" dirty="0" smtClean="0"/>
-              <a:t>Requirements 4</a:t>
-            </a:r>
+            <a:pPr marL="36576" indent="0">
+              <a:buNone/>
+            </a:pPr>
             <a:endParaRPr lang="en-US" dirty="0"/>
           </a:p>
         </p:txBody>
       </p:sp>
-      <p:sp>
-        <p:nvSpPr>
-          <p:cNvPr id="3" name="Content Placeholder 2"/>
-          <p:cNvSpPr>
-            <a:spLocks noGrp="1"/>
-          </p:cNvSpPr>
-          <p:nvPr>
-            <p:ph idx="1"/>
-          </p:nvPr>
-        </p:nvSpPr>
-        <p:spPr/>
-        <p:txBody>
-          <a:bodyPr/>
-          <a:lstStyle/>
-          <a:p>
-            <a:endParaRPr lang="en-US"/>
-          </a:p>
-        </p:txBody>
-      </p:sp>
+      <p:pic>
+        <p:nvPicPr>
+          <p:cNvPr id="6" name="Picture 5"/>
+          <p:cNvPicPr>
+            <a:picLocks noChangeAspect="1"/>
+          </p:cNvPicPr>
+          <p:nvPr/>
+        </p:nvPicPr>
+        <p:blipFill>
+          <a:blip r:embed="rId2"/>
+          <a:stretch>
+            <a:fillRect/>
+          </a:stretch>
+        </p:blipFill>
+        <p:spPr>
+          <a:xfrm>
+            <a:off x="1524000" y="787400"/>
+            <a:ext cx="6096000" cy="6070600"/>
+          </a:xfrm>
+          <a:prstGeom prst="rect">
+            <a:avLst/>
+          </a:prstGeom>
+        </p:spPr>
+      </p:pic>
     </p:spTree>
     <p:extLst>
       <p:ext uri="{BB962C8B-B14F-4D97-AF65-F5344CB8AC3E}">
-        <p14:creationId xmlns:p14="http://schemas.microsoft.com/office/powerpoint/2010/main" val="2930921673"/>
+        <p14:creationId xmlns:p14="http://schemas.microsoft.com/office/powerpoint/2010/main" val="2483841844"/>
       </p:ext>
     </p:extLst>
   </p:cSld>
   <p:clrMapOvr>
     <a:masterClrMapping/>
   </p:clrMapOvr>
+  <p:timing>
+    <p:tnLst>
+      <p:par>
+        <p:cTn xmlns:p14="http://schemas.microsoft.com/office/powerpoint/2010/main" id="1" dur="indefinite" restart="never" nodeType="tmRoot"/>
+      </p:par>
+    </p:tnLst>
+  </p:timing>
 </p:sld>
 </file>
 

</xml_diff>

<commit_message>
Another update on the presentation
</commit_message>
<xml_diff>
--- a/Presentation/Presentation.pptx
+++ b/Presentation/Presentation.pptx
@@ -983,15 +983,11 @@
           <a:p>
             <a:r>
               <a:rPr lang="en-US" dirty="0" smtClean="0"/>
-              <a:t>(Continue </a:t>
-            </a:r>
-            <a:r>
-              <a:rPr lang="en-US" dirty="0" err="1" smtClean="0"/>
-              <a:t>incremements</a:t>
-            </a:r>
-            <a:r>
-              <a:rPr lang="en-US" dirty="0" smtClean="0"/>
-              <a:t>)</a:t>
+              <a:t>(</a:t>
+            </a:r>
+            <a:r>
+              <a:rPr lang="en-US" smtClean="0"/>
+              <a:t>Continue incremements)</a:t>
             </a:r>
             <a:endParaRPr lang="en-US" dirty="0"/>
           </a:p>
@@ -10484,31 +10480,9 @@
           </a:p>
         </p:txBody>
       </p:sp>
-      <p:sp>
-        <p:nvSpPr>
-          <p:cNvPr id="3" name="Content Placeholder 2"/>
-          <p:cNvSpPr>
-            <a:spLocks noGrp="1"/>
-          </p:cNvSpPr>
-          <p:nvPr>
-            <p:ph idx="1"/>
-          </p:nvPr>
-        </p:nvSpPr>
-        <p:spPr/>
-        <p:txBody>
-          <a:bodyPr/>
-          <a:lstStyle/>
-          <a:p>
-            <a:pPr marL="36576" indent="0">
-              <a:buNone/>
-            </a:pPr>
-            <a:endParaRPr lang="en-US" dirty="0"/>
-          </a:p>
-        </p:txBody>
-      </p:sp>
       <p:pic>
         <p:nvPicPr>
-          <p:cNvPr id="6" name="Picture 5"/>
+          <p:cNvPr id="9" name="Picture 8"/>
           <p:cNvPicPr>
             <a:picLocks noChangeAspect="1"/>
           </p:cNvPicPr>
@@ -10522,8 +10496,8 @@
         </p:blipFill>
         <p:spPr>
           <a:xfrm>
-            <a:off x="1524000" y="787400"/>
-            <a:ext cx="6096000" cy="6070600"/>
+            <a:off x="2459188" y="1270313"/>
+            <a:ext cx="4539968" cy="5008610"/>
           </a:xfrm>
           <a:prstGeom prst="rect">
             <a:avLst/>

</xml_diff>